<commit_message>
Update 20200809 metaphor interpretation.pptx
</commit_message>
<xml_diff>
--- a/教学/20200809 metaphor interpretation.pptx
+++ b/教学/20200809 metaphor interpretation.pptx
@@ -5,7 +5,7 @@
     <p:sldMasterId id="2147483762" r:id="rId1"/>
   </p:sldMasterIdLst>
   <p:notesMasterIdLst>
-    <p:notesMasterId r:id="rId17"/>
+    <p:notesMasterId r:id="rId26"/>
   </p:notesMasterIdLst>
   <p:sldIdLst>
     <p:sldId id="256" r:id="rId2"/>
@@ -15,14 +15,23 @@
     <p:sldId id="310" r:id="rId6"/>
     <p:sldId id="311" r:id="rId7"/>
     <p:sldId id="312" r:id="rId8"/>
-    <p:sldId id="313" r:id="rId9"/>
-    <p:sldId id="314" r:id="rId10"/>
-    <p:sldId id="293" r:id="rId11"/>
-    <p:sldId id="283" r:id="rId12"/>
-    <p:sldId id="292" r:id="rId13"/>
-    <p:sldId id="294" r:id="rId14"/>
-    <p:sldId id="309" r:id="rId15"/>
-    <p:sldId id="306" r:id="rId16"/>
+    <p:sldId id="315" r:id="rId9"/>
+    <p:sldId id="317" r:id="rId10"/>
+    <p:sldId id="318" r:id="rId11"/>
+    <p:sldId id="319" r:id="rId12"/>
+    <p:sldId id="316" r:id="rId13"/>
+    <p:sldId id="320" r:id="rId14"/>
+    <p:sldId id="321" r:id="rId15"/>
+    <p:sldId id="322" r:id="rId16"/>
+    <p:sldId id="324" r:id="rId17"/>
+    <p:sldId id="323" r:id="rId18"/>
+    <p:sldId id="314" r:id="rId19"/>
+    <p:sldId id="283" r:id="rId20"/>
+    <p:sldId id="293" r:id="rId21"/>
+    <p:sldId id="292" r:id="rId22"/>
+    <p:sldId id="294" r:id="rId23"/>
+    <p:sldId id="309" r:id="rId24"/>
+    <p:sldId id="306" r:id="rId25"/>
   </p:sldIdLst>
   <p:sldSz cx="12192000" cy="6858000"/>
   <p:notesSz cx="6858000" cy="9144000"/>
@@ -476,6 +485,174 @@
     </a:lvl9pPr>
   </p:notesStyle>
 </p:notesMaster>
+</file>
+
+<file path=ppt/notesSlides/notesSlide1.xml><?xml version="1.0" encoding="utf-8"?>
+<p:notes xmlns:a="http://schemas.openxmlformats.org/drawingml/2006/main" xmlns:r="http://schemas.openxmlformats.org/officeDocument/2006/relationships" xmlns:p="http://schemas.openxmlformats.org/presentationml/2006/main">
+  <p:cSld>
+    <p:spTree>
+      <p:nvGrpSpPr>
+        <p:cNvPr id="1" name=""/>
+        <p:cNvGrpSpPr/>
+        <p:nvPr/>
+      </p:nvGrpSpPr>
+      <p:grpSpPr>
+        <a:xfrm>
+          <a:off x="0" y="0"/>
+          <a:ext cx="0" cy="0"/>
+          <a:chOff x="0" y="0"/>
+          <a:chExt cx="0" cy="0"/>
+        </a:xfrm>
+      </p:grpSpPr>
+      <p:sp>
+        <p:nvSpPr>
+          <p:cNvPr id="2" name="幻灯片图像占位符 1"/>
+          <p:cNvSpPr>
+            <a:spLocks noGrp="1" noRot="1" noChangeAspect="1"/>
+          </p:cNvSpPr>
+          <p:nvPr>
+            <p:ph type="sldImg"/>
+          </p:nvPr>
+        </p:nvSpPr>
+        <p:spPr/>
+      </p:sp>
+      <p:sp>
+        <p:nvSpPr>
+          <p:cNvPr id="3" name="备注占位符 2"/>
+          <p:cNvSpPr>
+            <a:spLocks noGrp="1"/>
+          </p:cNvSpPr>
+          <p:nvPr>
+            <p:ph type="body" idx="1"/>
+          </p:nvPr>
+        </p:nvSpPr>
+        <p:spPr/>
+        <p:txBody>
+          <a:bodyPr/>
+          <a:lstStyle/>
+          <a:p>
+            <a:endParaRPr kumimoji="1" lang="zh-CN" altLang="en-US" dirty="0"/>
+          </a:p>
+        </p:txBody>
+      </p:sp>
+      <p:sp>
+        <p:nvSpPr>
+          <p:cNvPr id="4" name="灯片编号占位符 3"/>
+          <p:cNvSpPr>
+            <a:spLocks noGrp="1"/>
+          </p:cNvSpPr>
+          <p:nvPr>
+            <p:ph type="sldNum" sz="quarter" idx="5"/>
+          </p:nvPr>
+        </p:nvSpPr>
+        <p:spPr/>
+        <p:txBody>
+          <a:bodyPr/>
+          <a:lstStyle/>
+          <a:p>
+            <a:fld id="{9E250128-22C0-4DD4-9D75-77FAE7196EDD}" type="slidenum">
+              <a:rPr lang="zh-CN" altLang="en-US" smtClean="0"/>
+              <a:t>10</a:t>
+            </a:fld>
+            <a:endParaRPr lang="zh-CN" altLang="en-US"/>
+          </a:p>
+        </p:txBody>
+      </p:sp>
+    </p:spTree>
+    <p:extLst>
+      <p:ext uri="{BB962C8B-B14F-4D97-AF65-F5344CB8AC3E}">
+        <p14:creationId xmlns:p14="http://schemas.microsoft.com/office/powerpoint/2010/main" val="2629807809"/>
+      </p:ext>
+    </p:extLst>
+  </p:cSld>
+  <p:clrMapOvr>
+    <a:masterClrMapping/>
+  </p:clrMapOvr>
+</p:notes>
+</file>
+
+<file path=ppt/notesSlides/notesSlide2.xml><?xml version="1.0" encoding="utf-8"?>
+<p:notes xmlns:a="http://schemas.openxmlformats.org/drawingml/2006/main" xmlns:r="http://schemas.openxmlformats.org/officeDocument/2006/relationships" xmlns:p="http://schemas.openxmlformats.org/presentationml/2006/main">
+  <p:cSld>
+    <p:spTree>
+      <p:nvGrpSpPr>
+        <p:cNvPr id="1" name=""/>
+        <p:cNvGrpSpPr/>
+        <p:nvPr/>
+      </p:nvGrpSpPr>
+      <p:grpSpPr>
+        <a:xfrm>
+          <a:off x="0" y="0"/>
+          <a:ext cx="0" cy="0"/>
+          <a:chOff x="0" y="0"/>
+          <a:chExt cx="0" cy="0"/>
+        </a:xfrm>
+      </p:grpSpPr>
+      <p:sp>
+        <p:nvSpPr>
+          <p:cNvPr id="2" name="幻灯片图像占位符 1"/>
+          <p:cNvSpPr>
+            <a:spLocks noGrp="1" noRot="1" noChangeAspect="1"/>
+          </p:cNvSpPr>
+          <p:nvPr>
+            <p:ph type="sldImg"/>
+          </p:nvPr>
+        </p:nvSpPr>
+        <p:spPr/>
+      </p:sp>
+      <p:sp>
+        <p:nvSpPr>
+          <p:cNvPr id="3" name="备注占位符 2"/>
+          <p:cNvSpPr>
+            <a:spLocks noGrp="1"/>
+          </p:cNvSpPr>
+          <p:nvPr>
+            <p:ph type="body" idx="1"/>
+          </p:nvPr>
+        </p:nvSpPr>
+        <p:spPr/>
+        <p:txBody>
+          <a:bodyPr/>
+          <a:lstStyle/>
+          <a:p>
+            <a:endParaRPr kumimoji="1" lang="zh-CN" altLang="en-US" dirty="0"/>
+          </a:p>
+        </p:txBody>
+      </p:sp>
+      <p:sp>
+        <p:nvSpPr>
+          <p:cNvPr id="4" name="灯片编号占位符 3"/>
+          <p:cNvSpPr>
+            <a:spLocks noGrp="1"/>
+          </p:cNvSpPr>
+          <p:nvPr>
+            <p:ph type="sldNum" sz="quarter" idx="5"/>
+          </p:nvPr>
+        </p:nvSpPr>
+        <p:spPr/>
+        <p:txBody>
+          <a:bodyPr/>
+          <a:lstStyle/>
+          <a:p>
+            <a:fld id="{9E250128-22C0-4DD4-9D75-77FAE7196EDD}" type="slidenum">
+              <a:rPr lang="zh-CN" altLang="en-US" smtClean="0"/>
+              <a:t>11</a:t>
+            </a:fld>
+            <a:endParaRPr lang="zh-CN" altLang="en-US"/>
+          </a:p>
+        </p:txBody>
+      </p:sp>
+    </p:spTree>
+    <p:extLst>
+      <p:ext uri="{BB962C8B-B14F-4D97-AF65-F5344CB8AC3E}">
+        <p14:creationId xmlns:p14="http://schemas.microsoft.com/office/powerpoint/2010/main" val="526740034"/>
+      </p:ext>
+    </p:extLst>
+  </p:cSld>
+  <p:clrMapOvr>
+    <a:masterClrMapping/>
+  </p:clrMapOvr>
+</p:notes>
 </file>
 
 <file path=ppt/slideLayouts/slideLayout1.xml><?xml version="1.0" encoding="utf-8"?>
@@ -4011,10 +4188,10 @@
       </p:grpSpPr>
       <p:sp>
         <p:nvSpPr>
-          <p:cNvPr id="14" name="文本框 13">
+          <p:cNvPr id="4" name="文本框 3">
             <a:extLst>
               <a:ext uri="{FF2B5EF4-FFF2-40B4-BE49-F238E27FC236}">
-                <a16:creationId xmlns:a16="http://schemas.microsoft.com/office/drawing/2014/main" id="{4C7A5F77-9114-4C49-8DFA-2D786179D15E}"/>
+                <a16:creationId xmlns:a16="http://schemas.microsoft.com/office/drawing/2014/main" id="{89689C59-38D4-4289-BDB3-8DB511A5181D}"/>
               </a:ext>
             </a:extLst>
           </p:cNvPr>
@@ -4023,8 +4200,8 @@
         </p:nvSpPr>
         <p:spPr>
           <a:xfrm>
-            <a:off x="269356" y="213360"/>
-            <a:ext cx="3723524" cy="461665"/>
+            <a:off x="788409" y="379575"/>
+            <a:ext cx="11339744" cy="400110"/>
           </a:xfrm>
           <a:prstGeom prst="rect">
             <a:avLst/>
@@ -4038,23 +4215,58 @@
           <a:lstStyle/>
           <a:p>
             <a:r>
-              <a:rPr lang="en-US" altLang="zh-CN" sz="2400" dirty="0">
-                <a:latin typeface="微软雅黑" panose="020B0503020204020204" pitchFamily="34" charset="-122"/>
-                <a:ea typeface="微软雅黑" panose="020B0503020204020204" pitchFamily="34" charset="-122"/>
-              </a:rPr>
-              <a:t>WordNet </a:t>
-            </a:r>
-            <a:r>
-              <a:rPr lang="zh-CN" altLang="en-US" sz="2400" dirty="0">
-                <a:latin typeface="微软雅黑" panose="020B0503020204020204" pitchFamily="34" charset="-122"/>
-                <a:ea typeface="微软雅黑" panose="020B0503020204020204" pitchFamily="34" charset="-122"/>
-              </a:rPr>
-              <a:t>玩一玩 看一看</a:t>
-            </a:r>
-            <a:endParaRPr lang="en-US" altLang="zh-CN" sz="2400" dirty="0">
-              <a:latin typeface="微软雅黑" panose="020B0503020204020204" pitchFamily="34" charset="-122"/>
-              <a:ea typeface="微软雅黑" panose="020B0503020204020204" pitchFamily="34" charset="-122"/>
-            </a:endParaRPr>
+              <a:rPr lang="en" altLang="zh-CN" sz="2000" dirty="0"/>
+              <a:t>Automatic detection and interpretation of nominal metaphor based on the</a:t>
+            </a:r>
+            <a:r>
+              <a:rPr lang="zh-CN" altLang="en-US" sz="2000" dirty="0"/>
+              <a:t> </a:t>
+            </a:r>
+            <a:r>
+              <a:rPr lang="en" altLang="zh-CN" sz="2000" dirty="0"/>
+              <a:t>theory of meaning</a:t>
+            </a:r>
+            <a:r>
+              <a:rPr lang="zh-CN" altLang="en-US" sz="2000" dirty="0"/>
+              <a:t>：</a:t>
+            </a:r>
+            <a:endParaRPr lang="en-US" altLang="zh-CN" sz="2000" dirty="0"/>
+          </a:p>
+        </p:txBody>
+      </p:sp>
+      <p:sp>
+        <p:nvSpPr>
+          <p:cNvPr id="5" name="文本框 4">
+            <a:extLst>
+              <a:ext uri="{FF2B5EF4-FFF2-40B4-BE49-F238E27FC236}">
+                <a16:creationId xmlns:a16="http://schemas.microsoft.com/office/drawing/2014/main" id="{6BD98EA0-3AA0-9F4B-AC9A-17C0AD6822B9}"/>
+              </a:ext>
+            </a:extLst>
+          </p:cNvPr>
+          <p:cNvSpPr txBox="1"/>
+          <p:nvPr/>
+        </p:nvSpPr>
+        <p:spPr>
+          <a:xfrm>
+            <a:off x="743608" y="779685"/>
+            <a:ext cx="2236510" cy="584775"/>
+          </a:xfrm>
+          <a:prstGeom prst="rect">
+            <a:avLst/>
+          </a:prstGeom>
+          <a:noFill/>
+        </p:spPr>
+        <p:txBody>
+          <a:bodyPr wrap="none" rtlCol="0">
+            <a:spAutoFit/>
+          </a:bodyPr>
+          <a:lstStyle/>
+          <a:p>
+            <a:r>
+              <a:rPr lang="zh-CN" altLang="en-US" sz="3200" dirty="0"/>
+              <a:t>理论基础：</a:t>
+            </a:r>
+            <a:endParaRPr lang="en-US" altLang="zh-CN" sz="3200" dirty="0"/>
           </a:p>
         </p:txBody>
       </p:sp>
@@ -4063,7 +4275,7 @@
           <p:cNvPr id="2" name="图片 1">
             <a:extLst>
               <a:ext uri="{FF2B5EF4-FFF2-40B4-BE49-F238E27FC236}">
-                <a16:creationId xmlns:a16="http://schemas.microsoft.com/office/drawing/2014/main" id="{36B8EFB8-CFB4-43D5-A2FC-0F15CB6F1E6F}"/>
+                <a16:creationId xmlns:a16="http://schemas.microsoft.com/office/drawing/2014/main" id="{31E224FC-F73D-4143-B343-77ACF2260412}"/>
               </a:ext>
             </a:extLst>
           </p:cNvPr>
@@ -4073,118 +4285,93 @@
           <p:nvPr/>
         </p:nvPicPr>
         <p:blipFill>
-          <a:blip r:embed="rId2"/>
+          <a:blip r:embed="rId3"/>
           <a:stretch>
             <a:fillRect/>
           </a:stretch>
         </p:blipFill>
         <p:spPr>
           <a:xfrm>
-            <a:off x="5567912" y="545404"/>
-            <a:ext cx="4620027" cy="5524839"/>
-          </a:xfrm>
-          <a:prstGeom prst="rect">
-            <a:avLst/>
+            <a:off x="3862518" y="1684420"/>
+            <a:ext cx="4466963" cy="1563437"/>
+          </a:xfrm>
+          <a:prstGeom prst="roundRect">
+            <a:avLst>
+              <a:gd name="adj" fmla="val 0"/>
+            </a:avLst>
           </a:prstGeom>
+          <a:solidFill>
+            <a:srgbClr val="FFFFFF">
+              <a:shade val="85000"/>
+            </a:srgbClr>
+          </a:solidFill>
           <a:ln>
             <a:noFill/>
           </a:ln>
           <a:effectLst>
-            <a:outerShdw blurRad="292100" dist="139700" dir="2700000" algn="tl" rotWithShape="0">
-              <a:srgbClr val="333333">
-                <a:alpha val="65000"/>
-              </a:srgbClr>
-            </a:outerShdw>
+            <a:reflection blurRad="12700" stA="38000" endPos="28000" dist="5000" dir="5400000" sy="-100000" algn="bl" rotWithShape="0"/>
           </a:effectLst>
         </p:spPr>
       </p:pic>
       <p:sp>
         <p:nvSpPr>
-          <p:cNvPr id="3" name="矩形 2">
+          <p:cNvPr id="7" name="文本框 6">
             <a:extLst>
               <a:ext uri="{FF2B5EF4-FFF2-40B4-BE49-F238E27FC236}">
-                <a16:creationId xmlns:a16="http://schemas.microsoft.com/office/drawing/2014/main" id="{29148177-998B-47C6-A413-E88B2AF2FDFA}"/>
+                <a16:creationId xmlns:a16="http://schemas.microsoft.com/office/drawing/2014/main" id="{A270BF78-0EA3-9249-8752-D16F6834AFFC}"/>
               </a:ext>
             </a:extLst>
           </p:cNvPr>
-          <p:cNvSpPr/>
+          <p:cNvSpPr txBox="1"/>
           <p:nvPr/>
         </p:nvSpPr>
         <p:spPr>
           <a:xfrm>
-            <a:off x="5231368" y="6356065"/>
-            <a:ext cx="5293116" cy="369332"/>
+            <a:off x="1038041" y="3610144"/>
+            <a:ext cx="10455470" cy="2677656"/>
           </a:xfrm>
           <a:prstGeom prst="rect">
             <a:avLst/>
           </a:prstGeom>
-        </p:spPr>
-        <p:txBody>
-          <a:bodyPr wrap="none">
+          <a:noFill/>
+        </p:spPr>
+        <p:txBody>
+          <a:bodyPr wrap="square" rtlCol="0">
             <a:spAutoFit/>
           </a:bodyPr>
           <a:lstStyle/>
           <a:p>
             <a:r>
-              <a:rPr lang="en-US" altLang="zh-CN" dirty="0">
-                <a:solidFill>
-                  <a:srgbClr val="6795B5"/>
-                </a:solidFill>
-                <a:latin typeface="Microsoft YaHei" panose="020B0503020204020204" pitchFamily="34" charset="-122"/>
-                <a:ea typeface="Microsoft YaHei" panose="020B0503020204020204" pitchFamily="34" charset="-122"/>
-                <a:hlinkClick r:id="rId3"/>
-              </a:rPr>
-              <a:t>http://wordnetweb.princeton.edu/perl/webwn</a:t>
-            </a:r>
-            <a:endParaRPr lang="zh-CN" altLang="en-US" dirty="0"/>
-          </a:p>
-        </p:txBody>
-      </p:sp>
-      <p:sp>
-        <p:nvSpPr>
-          <p:cNvPr id="4" name="矩形 3">
-            <a:extLst>
-              <a:ext uri="{FF2B5EF4-FFF2-40B4-BE49-F238E27FC236}">
-                <a16:creationId xmlns:a16="http://schemas.microsoft.com/office/drawing/2014/main" id="{33E257FD-527B-4EFF-9367-CD4693274594}"/>
-              </a:ext>
-            </a:extLst>
-          </p:cNvPr>
-          <p:cNvSpPr/>
-          <p:nvPr/>
-        </p:nvSpPr>
-        <p:spPr>
-          <a:xfrm>
-            <a:off x="878956" y="2492216"/>
-            <a:ext cx="3561197" cy="1631216"/>
-          </a:xfrm>
-          <a:prstGeom prst="rect">
-            <a:avLst/>
-          </a:prstGeom>
-        </p:spPr>
-        <p:txBody>
-          <a:bodyPr wrap="square">
-            <a:spAutoFit/>
-          </a:bodyPr>
-          <a:lstStyle/>
-          <a:p>
-            <a:r>
-              <a:rPr lang="zh-CN" altLang="en-US" sz="2000" dirty="0">
-                <a:solidFill>
-                  <a:srgbClr val="4D4D4D"/>
-                </a:solidFill>
-                <a:latin typeface="Microsoft YaHei" panose="020B0503020204020204" pitchFamily="34" charset="-122"/>
-                <a:ea typeface="Microsoft YaHei" panose="020B0503020204020204" pitchFamily="34" charset="-122"/>
-              </a:rPr>
-              <a:t>名词，动词，形容词和副词各自被组织成一个同义词的网络，每个同义词集合都代表一个基本的语义概念，并且这些集合之间也由各种关系连接。</a:t>
-            </a:r>
-            <a:endParaRPr lang="zh-CN" altLang="en-US" sz="2000" dirty="0"/>
+              <a:rPr lang="zh-CN" altLang="en-US" sz="2800" dirty="0"/>
+              <a:t>想象一个例子，“律师是狐狸”这个名词性隐喻的句子。</a:t>
+            </a:r>
+            <a:endParaRPr lang="en-US" altLang="zh-CN" sz="2800" dirty="0"/>
+          </a:p>
+          <a:p>
+            <a:endParaRPr lang="en-US" altLang="zh-CN" sz="2800" dirty="0"/>
+          </a:p>
+          <a:p>
+            <a:r>
+              <a:rPr lang="zh-CN" altLang="en-US" sz="2800" dirty="0"/>
+              <a:t>本体是“律师” 喻体是“狐狸”</a:t>
+            </a:r>
+            <a:endParaRPr lang="en-US" altLang="zh-CN" sz="2800" dirty="0"/>
+          </a:p>
+          <a:p>
+            <a:endParaRPr lang="en-US" altLang="zh-CN" sz="2800" dirty="0"/>
+          </a:p>
+          <a:p>
+            <a:r>
+              <a:rPr lang="zh-CN" altLang="en-US" sz="2800" dirty="0"/>
+              <a:t>隐喻的一个本质属性是同从异出，意思就是从不同的个体能够看到其中的相似之处。</a:t>
+            </a:r>
           </a:p>
         </p:txBody>
       </p:sp>
     </p:spTree>
     <p:extLst>
       <p:ext uri="{BB962C8B-B14F-4D97-AF65-F5344CB8AC3E}">
-        <p14:creationId xmlns:p14="http://schemas.microsoft.com/office/powerpoint/2010/main" val="2606029402"/>
+        <p14:creationId xmlns:p14="http://schemas.microsoft.com/office/powerpoint/2010/main" val="4039318980"/>
       </p:ext>
     </p:extLst>
   </p:cSld>
@@ -4213,10 +4400,10 @@
       </p:grpSpPr>
       <p:sp>
         <p:nvSpPr>
-          <p:cNvPr id="3" name="文本框 2">
+          <p:cNvPr id="4" name="文本框 3">
             <a:extLst>
               <a:ext uri="{FF2B5EF4-FFF2-40B4-BE49-F238E27FC236}">
-                <a16:creationId xmlns:a16="http://schemas.microsoft.com/office/drawing/2014/main" id="{934B47D1-33D4-4E4A-8626-897FB2BF44D9}"/>
+                <a16:creationId xmlns:a16="http://schemas.microsoft.com/office/drawing/2014/main" id="{89689C59-38D4-4289-BDB3-8DB511A5181D}"/>
               </a:ext>
             </a:extLst>
           </p:cNvPr>
@@ -4225,8 +4412,8 @@
         </p:nvSpPr>
         <p:spPr>
           <a:xfrm>
-            <a:off x="927208" y="426720"/>
-            <a:ext cx="10853312" cy="5940088"/>
+            <a:off x="788409" y="379575"/>
+            <a:ext cx="11339744" cy="400110"/>
           </a:xfrm>
           <a:prstGeom prst="rect">
             <a:avLst/>
@@ -4240,118 +4427,142 @@
           <a:lstStyle/>
           <a:p>
             <a:r>
-              <a:rPr lang="zh-CN" altLang="en-US" sz="3600" dirty="0"/>
-              <a:t>隐喻理解：使用或构建新型知识库</a:t>
-            </a:r>
-            <a:endParaRPr lang="en-US" altLang="zh-CN" sz="3600" dirty="0"/>
-          </a:p>
-          <a:p>
-            <a:endParaRPr lang="en-US" altLang="zh-CN" sz="3600" dirty="0"/>
-          </a:p>
-          <a:p>
-            <a:pPr marL="742950" indent="-742950">
-              <a:buAutoNum type="arabicPeriod"/>
-            </a:pPr>
+              <a:rPr lang="en" altLang="zh-CN" sz="2000" dirty="0"/>
+              <a:t>Automatic detection and interpretation of nominal metaphor based on the</a:t>
+            </a:r>
+            <a:r>
+              <a:rPr lang="zh-CN" altLang="en-US" sz="2000" dirty="0"/>
+              <a:t> </a:t>
+            </a:r>
+            <a:r>
+              <a:rPr lang="en" altLang="zh-CN" sz="2000" dirty="0"/>
+              <a:t>theory of meaning</a:t>
+            </a:r>
+            <a:r>
+              <a:rPr lang="zh-CN" altLang="en-US" sz="2000" dirty="0"/>
+              <a:t>：</a:t>
+            </a:r>
+            <a:endParaRPr lang="en-US" altLang="zh-CN" sz="2000" dirty="0"/>
+          </a:p>
+        </p:txBody>
+      </p:sp>
+      <p:sp>
+        <p:nvSpPr>
+          <p:cNvPr id="5" name="文本框 4">
+            <a:extLst>
+              <a:ext uri="{FF2B5EF4-FFF2-40B4-BE49-F238E27FC236}">
+                <a16:creationId xmlns:a16="http://schemas.microsoft.com/office/drawing/2014/main" id="{6BD98EA0-3AA0-9F4B-AC9A-17C0AD6822B9}"/>
+              </a:ext>
+            </a:extLst>
+          </p:cNvPr>
+          <p:cNvSpPr txBox="1"/>
+          <p:nvPr/>
+        </p:nvSpPr>
+        <p:spPr>
+          <a:xfrm>
+            <a:off x="743608" y="779685"/>
+            <a:ext cx="2236510" cy="584775"/>
+          </a:xfrm>
+          <a:prstGeom prst="rect">
+            <a:avLst/>
+          </a:prstGeom>
+          <a:noFill/>
+        </p:spPr>
+        <p:txBody>
+          <a:bodyPr wrap="none" rtlCol="0">
+            <a:spAutoFit/>
+          </a:bodyPr>
+          <a:lstStyle/>
+          <a:p>
+            <a:r>
+              <a:rPr lang="zh-CN" altLang="en-US" sz="3200" dirty="0"/>
+              <a:t>理论基础：</a:t>
+            </a:r>
+            <a:endParaRPr lang="en-US" altLang="zh-CN" sz="3200" dirty="0"/>
+          </a:p>
+        </p:txBody>
+      </p:sp>
+      <p:sp>
+        <p:nvSpPr>
+          <p:cNvPr id="7" name="文本框 6">
+            <a:extLst>
+              <a:ext uri="{FF2B5EF4-FFF2-40B4-BE49-F238E27FC236}">
+                <a16:creationId xmlns:a16="http://schemas.microsoft.com/office/drawing/2014/main" id="{A270BF78-0EA3-9249-8752-D16F6834AFFC}"/>
+              </a:ext>
+            </a:extLst>
+          </p:cNvPr>
+          <p:cNvSpPr txBox="1"/>
+          <p:nvPr/>
+        </p:nvSpPr>
+        <p:spPr>
+          <a:xfrm>
+            <a:off x="1230546" y="1542940"/>
+            <a:ext cx="10455470" cy="4832092"/>
+          </a:xfrm>
+          <a:prstGeom prst="rect">
+            <a:avLst/>
+          </a:prstGeom>
+          <a:noFill/>
+        </p:spPr>
+        <p:txBody>
+          <a:bodyPr wrap="square" rtlCol="0">
+            <a:spAutoFit/>
+          </a:bodyPr>
+          <a:lstStyle/>
+          <a:p>
+            <a:r>
+              <a:rPr lang="zh-CN" altLang="en-US" sz="2800" dirty="0"/>
+              <a:t>那么两者是通过什么进行合作的呢？</a:t>
+            </a:r>
+            <a:endParaRPr lang="en-US" altLang="zh-CN" sz="2800" dirty="0"/>
+          </a:p>
+          <a:p>
+            <a:endParaRPr lang="en-US" altLang="zh-CN" sz="2800" dirty="0"/>
+          </a:p>
+          <a:p>
             <a:r>
               <a:rPr lang="en-US" altLang="zh-CN" sz="2800" dirty="0"/>
-              <a:t>WordNet</a:t>
+              <a:t>1.</a:t>
             </a:r>
             <a:r>
               <a:rPr lang="zh-CN" altLang="en-US" sz="2800" dirty="0"/>
-              <a:t>在隐喻识别和隐喻理解中被广泛地用于捕捉词汇语义</a:t>
+              <a:t> 喻体展示自己的属性，本体也具有这个属性，一拍即合！</a:t>
             </a:r>
             <a:endParaRPr lang="en-US" altLang="zh-CN" sz="2800" dirty="0"/>
           </a:p>
           <a:p>
+            <a:endParaRPr lang="en-US" altLang="zh-CN" sz="2800" dirty="0"/>
+          </a:p>
+          <a:p>
             <a:r>
               <a:rPr lang="en-US" altLang="zh-CN" sz="2800" dirty="0"/>
-              <a:t>		</a:t>
-            </a:r>
-            <a:r>
-              <a:rPr lang="zh-CN" altLang="en-US" sz="2800" dirty="0">
-                <a:solidFill>
-                  <a:srgbClr val="FFC000"/>
-                </a:solidFill>
-              </a:rPr>
-              <a:t>为什么呢？</a:t>
-            </a:r>
-            <a:endParaRPr lang="en-US" altLang="zh-CN" sz="2800" dirty="0">
-              <a:solidFill>
-                <a:srgbClr val="FFC000"/>
-              </a:solidFill>
-            </a:endParaRPr>
+              <a:t>2.</a:t>
+            </a:r>
+            <a:r>
+              <a:rPr lang="zh-CN" altLang="en-US" sz="2800" dirty="0"/>
+              <a:t> 喻体展示自己的属性，本体却不具有这个属性，但本体有另一个属性与喻体的属性有一定的相似之处，则本体同意把这个属性作为合作的基础。</a:t>
+            </a:r>
+            <a:endParaRPr lang="en-US" altLang="zh-CN" sz="2800" dirty="0"/>
+          </a:p>
+          <a:p>
+            <a:endParaRPr lang="en-US" altLang="zh-CN" sz="2800" dirty="0"/>
           </a:p>
           <a:p>
             <a:r>
               <a:rPr lang="en-US" altLang="zh-CN" sz="2800" dirty="0"/>
-              <a:t>		</a:t>
+              <a:t>3.</a:t>
             </a:r>
             <a:r>
               <a:rPr lang="zh-CN" altLang="en-US" sz="2800" dirty="0"/>
-              <a:t>因为同义词概念之间由语义和词法相互连接，体系简单，层级</a:t>
-            </a:r>
-            <a:r>
-              <a:rPr lang="en-US" altLang="zh-CN" sz="2800" dirty="0"/>
-              <a:t>		</a:t>
-            </a:r>
-            <a:r>
-              <a:rPr lang="zh-CN" altLang="en-US" sz="2800" dirty="0"/>
-              <a:t>关系明显，</a:t>
-            </a:r>
-            <a:r>
-              <a:rPr lang="en-US" altLang="zh-CN" sz="2800" dirty="0"/>
-              <a:t>WordNet</a:t>
-            </a:r>
-            <a:r>
-              <a:rPr lang="zh-CN" altLang="en-US" sz="2800" dirty="0"/>
-              <a:t>中的单词距离也可以用来衡量单词的语义</a:t>
-            </a:r>
-            <a:r>
-              <a:rPr lang="en-US" altLang="zh-CN" sz="2800" dirty="0"/>
-              <a:t>		</a:t>
-            </a:r>
-            <a:r>
-              <a:rPr lang="zh-CN" altLang="en-US" sz="2800" dirty="0"/>
-              <a:t>关联性！</a:t>
-            </a:r>
-            <a:endParaRPr lang="en-US" altLang="zh-CN" sz="2800" dirty="0"/>
-          </a:p>
-          <a:p>
-            <a:endParaRPr lang="en-US" altLang="zh-CN" sz="2800" dirty="0"/>
-          </a:p>
-          <a:p>
-            <a:pPr marL="514350" indent="-514350">
-              <a:buAutoNum type="arabicPeriod" startAt="2"/>
-            </a:pPr>
-            <a:r>
-              <a:rPr lang="en-US" altLang="zh-CN" sz="2800" dirty="0" err="1"/>
-              <a:t>VerbNet</a:t>
-            </a:r>
-            <a:r>
-              <a:rPr lang="zh-CN" altLang="en-US" sz="2800" dirty="0"/>
-              <a:t>目前最大的英文在线动词词汇库。数据库中的每个动词类都用题元角色描述、描述参数的限制条件以及由语法和语义信息构成的框架等来描述。</a:t>
-            </a:r>
-            <a:endParaRPr lang="en-US" altLang="zh-CN" sz="2800" dirty="0"/>
-          </a:p>
-          <a:p>
-            <a:pPr marL="514350" indent="-514350">
-              <a:buAutoNum type="arabicPeriod" startAt="2"/>
-            </a:pPr>
-            <a:endParaRPr lang="en-US" altLang="zh-CN" sz="2800" dirty="0"/>
-          </a:p>
-          <a:p>
-            <a:r>
-              <a:rPr lang="zh-CN" altLang="en-US" sz="2800" dirty="0"/>
-              <a:t>两个知识库都有明显的层级关系。</a:t>
-            </a:r>
-            <a:endParaRPr lang="en-US" altLang="zh-CN" sz="2800" dirty="0"/>
+              <a:t> 喻体展示自己的属性，本体却不具有这个属性，并且本体的所有属性与喻体的所有属性均没有相似之处，但是如果本体与这个属性可以搭配！那么这也是可以作为一种合作的。</a:t>
+            </a:r>
           </a:p>
         </p:txBody>
       </p:sp>
     </p:spTree>
     <p:extLst>
       <p:ext uri="{BB962C8B-B14F-4D97-AF65-F5344CB8AC3E}">
-        <p14:creationId xmlns:p14="http://schemas.microsoft.com/office/powerpoint/2010/main" val="473480215"/>
+        <p14:creationId xmlns:p14="http://schemas.microsoft.com/office/powerpoint/2010/main" val="4144511064"/>
       </p:ext>
     </p:extLst>
   </p:cSld>
@@ -4380,10 +4591,10 @@
       </p:grpSpPr>
       <p:sp>
         <p:nvSpPr>
-          <p:cNvPr id="3" name="文本框 2">
+          <p:cNvPr id="4" name="文本框 3">
             <a:extLst>
               <a:ext uri="{FF2B5EF4-FFF2-40B4-BE49-F238E27FC236}">
-                <a16:creationId xmlns:a16="http://schemas.microsoft.com/office/drawing/2014/main" id="{934B47D1-33D4-4E4A-8626-897FB2BF44D9}"/>
+                <a16:creationId xmlns:a16="http://schemas.microsoft.com/office/drawing/2014/main" id="{89689C59-38D4-4289-BDB3-8DB511A5181D}"/>
               </a:ext>
             </a:extLst>
           </p:cNvPr>
@@ -4392,8 +4603,8 @@
         </p:nvSpPr>
         <p:spPr>
           <a:xfrm>
-            <a:off x="835768" y="243512"/>
-            <a:ext cx="10853312" cy="6370975"/>
+            <a:off x="788409" y="379575"/>
+            <a:ext cx="11339744" cy="400110"/>
           </a:xfrm>
           <a:prstGeom prst="rect">
             <a:avLst/>
@@ -4407,141 +4618,196 @@
           <a:lstStyle/>
           <a:p>
             <a:r>
-              <a:rPr lang="zh-CN" altLang="en-US" sz="3600" dirty="0"/>
-              <a:t>隐喻理解：使用或构建新型知识库</a:t>
-            </a:r>
-            <a:endParaRPr lang="en-US" altLang="zh-CN" sz="3600" dirty="0"/>
-          </a:p>
-          <a:p>
-            <a:endParaRPr lang="en-US" altLang="zh-CN" sz="3600" dirty="0"/>
-          </a:p>
-          <a:p>
+              <a:rPr lang="en" altLang="zh-CN" sz="2000" dirty="0"/>
+              <a:t>Automatic detection and interpretation of nominal metaphor based on the</a:t>
+            </a:r>
+            <a:r>
+              <a:rPr lang="zh-CN" altLang="en-US" sz="2000" dirty="0"/>
+              <a:t> </a:t>
+            </a:r>
+            <a:r>
+              <a:rPr lang="en" altLang="zh-CN" sz="2000" dirty="0"/>
+              <a:t>theory of meaning</a:t>
+            </a:r>
+            <a:r>
+              <a:rPr lang="zh-CN" altLang="en-US" sz="2000" dirty="0"/>
+              <a:t>：</a:t>
+            </a:r>
+            <a:endParaRPr lang="en-US" altLang="zh-CN" sz="2000" dirty="0"/>
+          </a:p>
+        </p:txBody>
+      </p:sp>
+      <p:sp>
+        <p:nvSpPr>
+          <p:cNvPr id="6" name="文本框 5">
+            <a:extLst>
+              <a:ext uri="{FF2B5EF4-FFF2-40B4-BE49-F238E27FC236}">
+                <a16:creationId xmlns:a16="http://schemas.microsoft.com/office/drawing/2014/main" id="{F1A26789-1B54-4618-9B03-77CEA71B450F}"/>
+              </a:ext>
+            </a:extLst>
+          </p:cNvPr>
+          <p:cNvSpPr txBox="1"/>
+          <p:nvPr/>
+        </p:nvSpPr>
+        <p:spPr>
+          <a:xfrm>
+            <a:off x="868265" y="2090172"/>
+            <a:ext cx="10455470" cy="4832092"/>
+          </a:xfrm>
+          <a:prstGeom prst="rect">
+            <a:avLst/>
+          </a:prstGeom>
+          <a:noFill/>
+        </p:spPr>
+        <p:txBody>
+          <a:bodyPr wrap="square" rtlCol="0">
+            <a:spAutoFit/>
+          </a:bodyPr>
+          <a:lstStyle/>
+          <a:p>
+            <a:pPr marL="514350" indent="-514350">
+              <a:buAutoNum type="arabicPeriod"/>
+            </a:pPr>
+            <a:r>
+              <a:rPr lang="zh-CN" altLang="en-US" sz="2800" dirty="0"/>
+              <a:t>属性提取：对于每一个隐喻句，使用</a:t>
+            </a:r>
             <a:r>
               <a:rPr lang="en-US" altLang="zh-CN" sz="2800" dirty="0"/>
-              <a:t>3. </a:t>
-            </a:r>
-            <a:r>
-              <a:rPr lang="en-US" altLang="zh-CN" sz="2800" dirty="0" err="1"/>
-              <a:t>FrameNet</a:t>
+              <a:t>Sardonicus</a:t>
             </a:r>
             <a:r>
               <a:rPr lang="zh-CN" altLang="en-US" sz="2800" dirty="0"/>
-              <a:t>，认为为绝大多数单词的意义可以通过语义框架呈现，</a:t>
+              <a:t>和属性知识库</a:t>
+            </a:r>
+            <a:r>
+              <a:rPr lang="en-US" altLang="zh-CN" sz="2800" dirty="0"/>
+              <a:t> (</a:t>
+            </a:r>
+            <a:r>
+              <a:rPr lang="zh-CN" altLang="en-US" sz="2800" dirty="0"/>
+              <a:t>厦门大学自建的</a:t>
+            </a:r>
+            <a:r>
+              <a:rPr lang="en-US" altLang="zh-CN" sz="2800" dirty="0"/>
+              <a:t>) </a:t>
+            </a:r>
+            <a:r>
+              <a:rPr lang="zh-CN" altLang="en-US" sz="2800" dirty="0"/>
+              <a:t>中提取源域属性。</a:t>
             </a:r>
             <a:endParaRPr lang="en-US" altLang="zh-CN" sz="2800" dirty="0"/>
           </a:p>
           <a:p>
+            <a:pPr marL="514350" indent="-514350">
+              <a:buAutoNum type="arabicPeriod"/>
+            </a:pPr>
+            <a:endParaRPr lang="en-US" altLang="zh-CN" sz="2800" dirty="0"/>
+          </a:p>
+          <a:p>
+            <a:pPr marL="514350" indent="-514350">
+              <a:buAutoNum type="arabicPeriod"/>
+            </a:pPr>
             <a:r>
               <a:rPr lang="zh-CN" altLang="en-US" sz="2800" dirty="0"/>
-              <a:t>库对拥有相同认知结构、相同类型的语义角色的词语进行归类，并用一个框架对这类词进行概述。</a:t>
-            </a:r>
+              <a:t>系统计算从目标域到源域各个属性之间的关联性。</a:t>
+            </a:r>
+            <a:endParaRPr lang="en-US" altLang="zh-CN" sz="2800" dirty="0"/>
+          </a:p>
+          <a:p>
+            <a:endParaRPr lang="en-US" altLang="zh-CN" sz="2800" dirty="0"/>
+          </a:p>
+          <a:p>
             <a:r>
               <a:rPr lang="en-US" altLang="zh-CN" sz="2800" dirty="0"/>
-              <a:t>NLP</a:t>
+              <a:t>3.</a:t>
             </a:r>
             <a:r>
               <a:rPr lang="zh-CN" altLang="en-US" sz="2800" dirty="0"/>
-              <a:t>上用在语义方面老好了</a:t>
+              <a:t>  根据哈工大同义词林和</a:t>
             </a:r>
             <a:r>
               <a:rPr lang="en-US" altLang="zh-CN" sz="2800" dirty="0"/>
-              <a:t>_(:з</a:t>
+              <a:t>WordNet</a:t>
             </a:r>
             <a:r>
               <a:rPr lang="zh-CN" altLang="en-US" sz="2800" dirty="0"/>
-              <a:t>ゝ∠</a:t>
-            </a:r>
+              <a:t>扩充每一个源域的同义词。</a:t>
+            </a:r>
+            <a:endParaRPr lang="en-US" altLang="zh-CN" sz="2800" dirty="0"/>
+          </a:p>
+          <a:p>
+            <a:r>
+              <a:rPr lang="zh-CN" altLang="en-US" sz="2800" dirty="0"/>
+              <a:t>基于词向量模型使用余弦相似度进行相关性度量。</a:t>
+            </a:r>
+            <a:endParaRPr lang="en-US" altLang="zh-CN" sz="2800" dirty="0"/>
+          </a:p>
+          <a:p>
+            <a:endParaRPr lang="en-US" altLang="zh-CN" sz="2800" dirty="0"/>
+          </a:p>
+          <a:p>
             <a:r>
               <a:rPr lang="en-US" altLang="zh-CN" sz="2800" dirty="0"/>
-              <a:t>)_</a:t>
-            </a:r>
-          </a:p>
-          <a:p>
+              <a:t>4.</a:t>
+            </a:r>
+            <a:r>
+              <a:rPr lang="zh-CN" altLang="en-US" sz="2800" dirty="0"/>
+              <a:t>  系统选取最相关的属性作为隐喻的最佳释意。</a:t>
+            </a:r>
             <a:endParaRPr lang="en-US" altLang="zh-CN" sz="2800" dirty="0"/>
           </a:p>
           <a:p>
-            <a:r>
-              <a:rPr lang="en-US" altLang="zh-CN" sz="2800" dirty="0"/>
-              <a:t>4. </a:t>
-            </a:r>
-            <a:r>
-              <a:rPr lang="en-US" altLang="zh-CN" sz="2800" dirty="0" err="1"/>
-              <a:t>HowNet</a:t>
-            </a:r>
-            <a:r>
-              <a:rPr lang="zh-CN" altLang="en-US" sz="2800" dirty="0"/>
-              <a:t>，关注词语概念，是一个以义原为基本单位构建的中英双语知识库。它将概念与概念之间的关系以及概念及其属性之间的关系形成了一个网状的常识系统。</a:t>
-            </a:r>
             <a:endParaRPr lang="en-US" altLang="zh-CN" sz="2800" dirty="0"/>
           </a:p>
           <a:p>
+            <a:pPr marL="514350" indent="-514350">
+              <a:buAutoNum type="arabicPeriod"/>
+            </a:pPr>
             <a:endParaRPr lang="en-US" altLang="zh-CN" sz="2800" dirty="0"/>
           </a:p>
-          <a:p>
-            <a:r>
-              <a:rPr lang="en-US" altLang="zh-CN" sz="2800" dirty="0"/>
-              <a:t>5. </a:t>
-            </a:r>
-            <a:r>
-              <a:rPr lang="en-US" altLang="zh-CN" sz="2800" dirty="0" err="1"/>
-              <a:t>Cogbank</a:t>
-            </a:r>
-            <a:r>
-              <a:rPr lang="en-US" altLang="zh-CN" sz="2800" dirty="0"/>
-              <a:t> </a:t>
-            </a:r>
-            <a:r>
-              <a:rPr lang="zh-CN" altLang="en-US" sz="2800" dirty="0"/>
-              <a:t>是一个自主构建的汉语认知属性知识库。它通过指定隐喻句的句法结构“目标域</a:t>
-            </a:r>
-            <a:r>
-              <a:rPr lang="en-US" altLang="zh-CN" sz="2800" dirty="0"/>
-              <a:t>+</a:t>
-            </a:r>
-            <a:r>
-              <a:rPr lang="zh-CN" altLang="en-US" sz="2800" dirty="0"/>
-              <a:t>像</a:t>
-            </a:r>
-            <a:r>
-              <a:rPr lang="en-US" altLang="zh-CN" sz="2800" dirty="0"/>
-              <a:t>+</a:t>
-            </a:r>
-            <a:r>
-              <a:rPr lang="zh-CN" altLang="en-US" sz="2800" dirty="0"/>
-              <a:t>源域</a:t>
-            </a:r>
-            <a:r>
-              <a:rPr lang="en-US" altLang="zh-CN" sz="2800" dirty="0"/>
-              <a:t>+</a:t>
-            </a:r>
-            <a:r>
-              <a:rPr lang="zh-CN" altLang="en-US" sz="2800" dirty="0"/>
-              <a:t>一样</a:t>
-            </a:r>
-            <a:r>
-              <a:rPr lang="en-US" altLang="zh-CN" sz="2800" dirty="0"/>
-              <a:t>+</a:t>
-            </a:r>
-            <a:r>
-              <a:rPr lang="zh-CN" altLang="en-US" sz="2800" dirty="0"/>
-              <a:t>属性”，从网页中爬取了近百万条“源域词语</a:t>
-            </a:r>
-            <a:r>
-              <a:rPr lang="en-US" altLang="zh-CN" sz="2800" dirty="0"/>
-              <a:t>-</a:t>
-            </a:r>
-            <a:r>
-              <a:rPr lang="zh-CN" altLang="en-US" sz="2800" dirty="0"/>
-              <a:t>属性”对。经过人工校对和信息整理，获得二十多万条词语认知属性对，共包含近万个词语以及认知属性。</a:t>
-            </a:r>
-            <a:endParaRPr lang="en-US" altLang="zh-CN" sz="2800" dirty="0"/>
+        </p:txBody>
+      </p:sp>
+      <p:sp>
+        <p:nvSpPr>
+          <p:cNvPr id="5" name="文本框 4">
+            <a:extLst>
+              <a:ext uri="{FF2B5EF4-FFF2-40B4-BE49-F238E27FC236}">
+                <a16:creationId xmlns:a16="http://schemas.microsoft.com/office/drawing/2014/main" id="{6BD98EA0-3AA0-9F4B-AC9A-17C0AD6822B9}"/>
+              </a:ext>
+            </a:extLst>
+          </p:cNvPr>
+          <p:cNvSpPr txBox="1"/>
+          <p:nvPr/>
+        </p:nvSpPr>
+        <p:spPr>
+          <a:xfrm>
+            <a:off x="743608" y="779685"/>
+            <a:ext cx="4017446" cy="584775"/>
+          </a:xfrm>
+          <a:prstGeom prst="rect">
+            <a:avLst/>
+          </a:prstGeom>
+          <a:noFill/>
+        </p:spPr>
+        <p:txBody>
+          <a:bodyPr wrap="none" rtlCol="0">
+            <a:spAutoFit/>
+          </a:bodyPr>
+          <a:lstStyle/>
+          <a:p>
+            <a:r>
+              <a:rPr lang="zh-CN" altLang="en-US" sz="3200" dirty="0"/>
+              <a:t>隐喻理解模型步骤：</a:t>
+            </a:r>
+            <a:endParaRPr lang="en-US" altLang="zh-CN" sz="3200" dirty="0"/>
           </a:p>
         </p:txBody>
       </p:sp>
     </p:spTree>
     <p:extLst>
       <p:ext uri="{BB962C8B-B14F-4D97-AF65-F5344CB8AC3E}">
-        <p14:creationId xmlns:p14="http://schemas.microsoft.com/office/powerpoint/2010/main" val="4259264578"/>
+        <p14:creationId xmlns:p14="http://schemas.microsoft.com/office/powerpoint/2010/main" val="474935150"/>
       </p:ext>
     </p:extLst>
   </p:cSld>
@@ -4570,10 +4836,10 @@
       </p:grpSpPr>
       <p:sp>
         <p:nvSpPr>
-          <p:cNvPr id="3" name="文本框 2">
+          <p:cNvPr id="4" name="文本框 3">
             <a:extLst>
               <a:ext uri="{FF2B5EF4-FFF2-40B4-BE49-F238E27FC236}">
-                <a16:creationId xmlns:a16="http://schemas.microsoft.com/office/drawing/2014/main" id="{934B47D1-33D4-4E4A-8626-897FB2BF44D9}"/>
+                <a16:creationId xmlns:a16="http://schemas.microsoft.com/office/drawing/2014/main" id="{89689C59-38D4-4289-BDB3-8DB511A5181D}"/>
               </a:ext>
             </a:extLst>
           </p:cNvPr>
@@ -4582,8 +4848,8 @@
         </p:nvSpPr>
         <p:spPr>
           <a:xfrm>
-            <a:off x="835768" y="243512"/>
-            <a:ext cx="10853312" cy="4031873"/>
+            <a:off x="788409" y="379575"/>
+            <a:ext cx="11339744" cy="400110"/>
           </a:xfrm>
           <a:prstGeom prst="rect">
             <a:avLst/>
@@ -4597,37 +4863,151 @@
           <a:lstStyle/>
           <a:p>
             <a:r>
-              <a:rPr lang="zh-CN" altLang="en-US" sz="3600" dirty="0"/>
-              <a:t>隐喻理解：使用或构建新型知识库</a:t>
-            </a:r>
-            <a:endParaRPr lang="en-US" altLang="zh-CN" sz="3600" dirty="0"/>
-          </a:p>
-          <a:p>
-            <a:endParaRPr lang="en-US" altLang="zh-CN" sz="3600" dirty="0"/>
-          </a:p>
-          <a:p>
-            <a:endParaRPr lang="en-US" altLang="zh-CN" sz="3600" dirty="0"/>
-          </a:p>
-          <a:p>
-            <a:endParaRPr lang="en-US" altLang="zh-CN" sz="3600" dirty="0"/>
-          </a:p>
-          <a:p>
-            <a:r>
-              <a:rPr lang="en-US" altLang="zh-CN" sz="2800" dirty="0"/>
-              <a:t>6. </a:t>
-            </a:r>
-            <a:r>
-              <a:rPr lang="zh-CN" altLang="en-US" sz="2800" dirty="0"/>
-              <a:t>文化属性知识库，处理包含文化负载词的隐喻必须进行文化属性知识嵌入。他们从经典古籍、传统文化研究著作中抽取中国文化中的概念 隐喻，并基于概念隐喻映射获取文化负载词的属性知识，构建文化属性知识库。</a:t>
-            </a:r>
-            <a:endParaRPr lang="en-US" altLang="zh-CN" sz="2800" dirty="0"/>
-          </a:p>
-        </p:txBody>
-      </p:sp>
+              <a:rPr lang="en" altLang="zh-CN" sz="2000" dirty="0"/>
+              <a:t>Automatic detection and interpretation of nominal metaphor based on the</a:t>
+            </a:r>
+            <a:r>
+              <a:rPr lang="zh-CN" altLang="en-US" sz="2000" dirty="0"/>
+              <a:t> </a:t>
+            </a:r>
+            <a:r>
+              <a:rPr lang="en" altLang="zh-CN" sz="2000" dirty="0"/>
+              <a:t>theory of meaning</a:t>
+            </a:r>
+            <a:r>
+              <a:rPr lang="zh-CN" altLang="en-US" sz="2000" dirty="0"/>
+              <a:t>：</a:t>
+            </a:r>
+            <a:endParaRPr lang="en-US" altLang="zh-CN" sz="2000" dirty="0"/>
+          </a:p>
+        </p:txBody>
+      </p:sp>
+      <p:sp>
+        <p:nvSpPr>
+          <p:cNvPr id="5" name="文本框 4">
+            <a:extLst>
+              <a:ext uri="{FF2B5EF4-FFF2-40B4-BE49-F238E27FC236}">
+                <a16:creationId xmlns:a16="http://schemas.microsoft.com/office/drawing/2014/main" id="{6BD98EA0-3AA0-9F4B-AC9A-17C0AD6822B9}"/>
+              </a:ext>
+            </a:extLst>
+          </p:cNvPr>
+          <p:cNvSpPr txBox="1"/>
+          <p:nvPr/>
+        </p:nvSpPr>
+        <p:spPr>
+          <a:xfrm>
+            <a:off x="743608" y="779685"/>
+            <a:ext cx="2722220" cy="584775"/>
+          </a:xfrm>
+          <a:prstGeom prst="rect">
+            <a:avLst/>
+          </a:prstGeom>
+          <a:noFill/>
+        </p:spPr>
+        <p:txBody>
+          <a:bodyPr wrap="none" rtlCol="0">
+            <a:spAutoFit/>
+          </a:bodyPr>
+          <a:lstStyle/>
+          <a:p>
+            <a:r>
+              <a:rPr lang="zh-CN" altLang="en-US" sz="3200" dirty="0"/>
+              <a:t>计算相似度：</a:t>
+            </a:r>
+            <a:endParaRPr lang="en-US" altLang="zh-CN" sz="3200" dirty="0"/>
+          </a:p>
+        </p:txBody>
+      </p:sp>
+      <p:pic>
+        <p:nvPicPr>
+          <p:cNvPr id="2" name="图片 1">
+            <a:extLst>
+              <a:ext uri="{FF2B5EF4-FFF2-40B4-BE49-F238E27FC236}">
+                <a16:creationId xmlns:a16="http://schemas.microsoft.com/office/drawing/2014/main" id="{E789A1AD-2F66-9A44-8DF6-FBE91866E1BB}"/>
+              </a:ext>
+            </a:extLst>
+          </p:cNvPr>
+          <p:cNvPicPr>
+            <a:picLocks noChangeAspect="1"/>
+          </p:cNvPicPr>
+          <p:nvPr/>
+        </p:nvPicPr>
+        <p:blipFill>
+          <a:blip r:embed="rId2"/>
+          <a:stretch>
+            <a:fillRect/>
+          </a:stretch>
+        </p:blipFill>
+        <p:spPr>
+          <a:xfrm>
+            <a:off x="8038097" y="1813700"/>
+            <a:ext cx="3499507" cy="4402889"/>
+          </a:xfrm>
+          <a:prstGeom prst="roundRect">
+            <a:avLst>
+              <a:gd name="adj" fmla="val 0"/>
+            </a:avLst>
+          </a:prstGeom>
+          <a:solidFill>
+            <a:srgbClr val="FFFFFF">
+              <a:shade val="85000"/>
+            </a:srgbClr>
+          </a:solidFill>
+          <a:ln>
+            <a:noFill/>
+          </a:ln>
+          <a:effectLst>
+            <a:reflection blurRad="12700" stA="38000" endPos="28000" dist="5000" dir="5400000" sy="-100000" algn="bl" rotWithShape="0"/>
+          </a:effectLst>
+        </p:spPr>
+      </p:pic>
+      <p:pic>
+        <p:nvPicPr>
+          <p:cNvPr id="3" name="图片 2">
+            <a:extLst>
+              <a:ext uri="{FF2B5EF4-FFF2-40B4-BE49-F238E27FC236}">
+                <a16:creationId xmlns:a16="http://schemas.microsoft.com/office/drawing/2014/main" id="{E3592BF8-2CA9-8640-8C1B-5C1B994E1ADB}"/>
+              </a:ext>
+            </a:extLst>
+          </p:cNvPr>
+          <p:cNvPicPr>
+            <a:picLocks noChangeAspect="1"/>
+          </p:cNvPicPr>
+          <p:nvPr/>
+        </p:nvPicPr>
+        <p:blipFill>
+          <a:blip r:embed="rId3"/>
+          <a:stretch>
+            <a:fillRect/>
+          </a:stretch>
+        </p:blipFill>
+        <p:spPr>
+          <a:xfrm>
+            <a:off x="2371623" y="3113444"/>
+            <a:ext cx="3797300" cy="901700"/>
+          </a:xfrm>
+          <a:prstGeom prst="roundRect">
+            <a:avLst>
+              <a:gd name="adj" fmla="val 0"/>
+            </a:avLst>
+          </a:prstGeom>
+          <a:solidFill>
+            <a:srgbClr val="FFFFFF">
+              <a:shade val="85000"/>
+            </a:srgbClr>
+          </a:solidFill>
+          <a:ln>
+            <a:noFill/>
+          </a:ln>
+          <a:effectLst>
+            <a:reflection blurRad="12700" stA="38000" endPos="28000" dist="5000" dir="5400000" sy="-100000" algn="bl" rotWithShape="0"/>
+          </a:effectLst>
+        </p:spPr>
+      </p:pic>
     </p:spTree>
     <p:extLst>
       <p:ext uri="{BB962C8B-B14F-4D97-AF65-F5344CB8AC3E}">
-        <p14:creationId xmlns:p14="http://schemas.microsoft.com/office/powerpoint/2010/main" val="2971794433"/>
+        <p14:creationId xmlns:p14="http://schemas.microsoft.com/office/powerpoint/2010/main" val="1512388036"/>
       </p:ext>
     </p:extLst>
   </p:cSld>
@@ -4668,8 +5048,8 @@
         </p:nvSpPr>
         <p:spPr>
           <a:xfrm>
-            <a:off x="848768" y="2627739"/>
-            <a:ext cx="7047122" cy="1384995"/>
+            <a:off x="788409" y="379575"/>
+            <a:ext cx="11339744" cy="400110"/>
           </a:xfrm>
           <a:prstGeom prst="rect">
             <a:avLst/>
@@ -4677,43 +5057,37 @@
           <a:noFill/>
         </p:spPr>
         <p:txBody>
-          <a:bodyPr wrap="none" rtlCol="0">
+          <a:bodyPr wrap="square" rtlCol="0">
             <a:spAutoFit/>
           </a:bodyPr>
           <a:lstStyle/>
           <a:p>
-            <a:endParaRPr lang="en-US" altLang="zh-CN" sz="2800" dirty="0"/>
-          </a:p>
-          <a:p>
-            <a:r>
-              <a:rPr lang="en-US" altLang="zh-CN" sz="2800" dirty="0"/>
-              <a:t>1. </a:t>
-            </a:r>
-            <a:r>
-              <a:rPr lang="zh-CN" altLang="en-US" sz="2800" dirty="0"/>
-              <a:t>把知识图谱的概念拓展到隐喻识别当中。</a:t>
-            </a:r>
-            <a:endParaRPr lang="en-US" altLang="zh-CN" sz="2800" dirty="0"/>
-          </a:p>
-          <a:p>
-            <a:r>
-              <a:rPr lang="en-US" altLang="zh-CN" sz="2800" dirty="0"/>
-              <a:t>2. </a:t>
-            </a:r>
-            <a:r>
-              <a:rPr lang="zh-CN" altLang="en-US" sz="2800" dirty="0"/>
-              <a:t>把情感分析的概念拓展到隐喻理解当中。</a:t>
-            </a:r>
-            <a:endParaRPr lang="en-US" altLang="zh-CN" sz="2800" dirty="0"/>
-          </a:p>
-        </p:txBody>
-      </p:sp>
-      <p:sp>
-        <p:nvSpPr>
-          <p:cNvPr id="6" name="文本框 5">
+            <a:r>
+              <a:rPr lang="en" altLang="zh-CN" sz="2000" dirty="0"/>
+              <a:t>Automatic detection and interpretation of nominal metaphor based on the</a:t>
+            </a:r>
+            <a:r>
+              <a:rPr lang="zh-CN" altLang="en-US" sz="2000" dirty="0"/>
+              <a:t> </a:t>
+            </a:r>
+            <a:r>
+              <a:rPr lang="en" altLang="zh-CN" sz="2000" dirty="0"/>
+              <a:t>theory of meaning</a:t>
+            </a:r>
+            <a:r>
+              <a:rPr lang="zh-CN" altLang="en-US" sz="2000" dirty="0"/>
+              <a:t>：</a:t>
+            </a:r>
+            <a:endParaRPr lang="en-US" altLang="zh-CN" sz="2000" dirty="0"/>
+          </a:p>
+        </p:txBody>
+      </p:sp>
+      <p:sp>
+        <p:nvSpPr>
+          <p:cNvPr id="5" name="文本框 4">
             <a:extLst>
               <a:ext uri="{FF2B5EF4-FFF2-40B4-BE49-F238E27FC236}">
-                <a16:creationId xmlns:a16="http://schemas.microsoft.com/office/drawing/2014/main" id="{9C48A8B9-2434-4532-AF3A-E8C18969B760}"/>
+                <a16:creationId xmlns:a16="http://schemas.microsoft.com/office/drawing/2014/main" id="{6BD98EA0-3AA0-9F4B-AC9A-17C0AD6822B9}"/>
               </a:ext>
             </a:extLst>
           </p:cNvPr>
@@ -4722,8 +5096,8 @@
         </p:nvSpPr>
         <p:spPr>
           <a:xfrm>
-            <a:off x="3220854" y="807274"/>
-            <a:ext cx="5750292" cy="923330"/>
+            <a:off x="743608" y="779685"/>
+            <a:ext cx="3467616" cy="584775"/>
           </a:xfrm>
           <a:prstGeom prst="rect">
             <a:avLst/>
@@ -4737,17 +5111,60 @@
           <a:lstStyle/>
           <a:p>
             <a:r>
-              <a:rPr lang="zh-CN" altLang="en-US" sz="5400" b="1" dirty="0"/>
-              <a:t>这段学习的新想法</a:t>
-            </a:r>
-            <a:endParaRPr lang="en-US" altLang="zh-CN" sz="5400" b="1" dirty="0"/>
-          </a:p>
-        </p:txBody>
-      </p:sp>
+              <a:rPr lang="zh-CN" altLang="en-US" sz="3200" dirty="0"/>
+              <a:t>属性提取后结果：</a:t>
+            </a:r>
+            <a:endParaRPr lang="en-US" altLang="zh-CN" sz="3200" dirty="0"/>
+          </a:p>
+        </p:txBody>
+      </p:sp>
+      <p:pic>
+        <p:nvPicPr>
+          <p:cNvPr id="6" name="图片 5">
+            <a:extLst>
+              <a:ext uri="{FF2B5EF4-FFF2-40B4-BE49-F238E27FC236}">
+                <a16:creationId xmlns:a16="http://schemas.microsoft.com/office/drawing/2014/main" id="{E3E1B444-F954-6444-8B47-FA70FBF138D0}"/>
+              </a:ext>
+            </a:extLst>
+          </p:cNvPr>
+          <p:cNvPicPr>
+            <a:picLocks noChangeAspect="1"/>
+          </p:cNvPicPr>
+          <p:nvPr/>
+        </p:nvPicPr>
+        <p:blipFill>
+          <a:blip r:embed="rId2"/>
+          <a:stretch>
+            <a:fillRect/>
+          </a:stretch>
+        </p:blipFill>
+        <p:spPr>
+          <a:xfrm>
+            <a:off x="4211224" y="1624626"/>
+            <a:ext cx="3982122" cy="4453689"/>
+          </a:xfrm>
+          <a:prstGeom prst="roundRect">
+            <a:avLst>
+              <a:gd name="adj" fmla="val 0"/>
+            </a:avLst>
+          </a:prstGeom>
+          <a:solidFill>
+            <a:srgbClr val="FFFFFF">
+              <a:shade val="85000"/>
+            </a:srgbClr>
+          </a:solidFill>
+          <a:ln>
+            <a:noFill/>
+          </a:ln>
+          <a:effectLst>
+            <a:reflection blurRad="12700" stA="38000" endPos="28000" dist="5000" dir="5400000" sy="-100000" algn="bl" rotWithShape="0"/>
+          </a:effectLst>
+        </p:spPr>
+      </p:pic>
     </p:spTree>
     <p:extLst>
       <p:ext uri="{BB962C8B-B14F-4D97-AF65-F5344CB8AC3E}">
-        <p14:creationId xmlns:p14="http://schemas.microsoft.com/office/powerpoint/2010/main" val="361049474"/>
+        <p14:creationId xmlns:p14="http://schemas.microsoft.com/office/powerpoint/2010/main" val="2179933329"/>
       </p:ext>
     </p:extLst>
   </p:cSld>
@@ -4788,8 +5205,8 @@
         </p:nvSpPr>
         <p:spPr>
           <a:xfrm>
-            <a:off x="848768" y="2627739"/>
-            <a:ext cx="5610831" cy="1384995"/>
+            <a:off x="788409" y="379575"/>
+            <a:ext cx="11339744" cy="400110"/>
           </a:xfrm>
           <a:prstGeom prst="rect">
             <a:avLst/>
@@ -4797,47 +5214,37 @@
           <a:noFill/>
         </p:spPr>
         <p:txBody>
-          <a:bodyPr wrap="none" rtlCol="0">
+          <a:bodyPr wrap="square" rtlCol="0">
             <a:spAutoFit/>
           </a:bodyPr>
           <a:lstStyle/>
           <a:p>
             <a:r>
-              <a:rPr lang="zh-CN" altLang="en-US" sz="2800" dirty="0"/>
-              <a:t>下期内容：</a:t>
-            </a:r>
-            <a:endParaRPr lang="en-US" altLang="zh-CN" sz="2800" dirty="0"/>
-          </a:p>
-          <a:p>
-            <a:r>
-              <a:rPr lang="en-US" altLang="zh-CN" sz="2800" dirty="0"/>
-              <a:t>0. </a:t>
-            </a:r>
-            <a:r>
-              <a:rPr lang="zh-CN" altLang="en-US" sz="2800" dirty="0"/>
-              <a:t>隐喻识别下的序列化标注探究。</a:t>
-            </a:r>
-            <a:endParaRPr lang="en-US" altLang="zh-CN" sz="2800" dirty="0"/>
-          </a:p>
-          <a:p>
-            <a:r>
-              <a:rPr lang="en-US" altLang="zh-CN" sz="2800" dirty="0"/>
-              <a:t>2. </a:t>
-            </a:r>
-            <a:r>
-              <a:rPr lang="zh-CN" altLang="en-US" sz="2800" dirty="0"/>
-              <a:t>隐喻理解下的更多探究。</a:t>
-            </a:r>
-            <a:endParaRPr lang="en-US" altLang="zh-CN" sz="2800" dirty="0"/>
-          </a:p>
-        </p:txBody>
-      </p:sp>
-      <p:sp>
-        <p:nvSpPr>
-          <p:cNvPr id="6" name="文本框 5">
+              <a:rPr lang="en" altLang="zh-CN" sz="2000" dirty="0"/>
+              <a:t>Automatic detection and interpretation of nominal metaphor based on the</a:t>
+            </a:r>
+            <a:r>
+              <a:rPr lang="zh-CN" altLang="en-US" sz="2000" dirty="0"/>
+              <a:t> </a:t>
+            </a:r>
+            <a:r>
+              <a:rPr lang="en" altLang="zh-CN" sz="2000" dirty="0"/>
+              <a:t>theory of meaning</a:t>
+            </a:r>
+            <a:r>
+              <a:rPr lang="zh-CN" altLang="en-US" sz="2000" dirty="0"/>
+              <a:t>：</a:t>
+            </a:r>
+            <a:endParaRPr lang="en-US" altLang="zh-CN" sz="2000" dirty="0"/>
+          </a:p>
+        </p:txBody>
+      </p:sp>
+      <p:sp>
+        <p:nvSpPr>
+          <p:cNvPr id="5" name="文本框 4">
             <a:extLst>
               <a:ext uri="{FF2B5EF4-FFF2-40B4-BE49-F238E27FC236}">
-                <a16:creationId xmlns:a16="http://schemas.microsoft.com/office/drawing/2014/main" id="{9C48A8B9-2434-4532-AF3A-E8C18969B760}"/>
+                <a16:creationId xmlns:a16="http://schemas.microsoft.com/office/drawing/2014/main" id="{6BD98EA0-3AA0-9F4B-AC9A-17C0AD6822B9}"/>
               </a:ext>
             </a:extLst>
           </p:cNvPr>
@@ -4846,8 +5253,8 @@
         </p:nvSpPr>
         <p:spPr>
           <a:xfrm>
-            <a:off x="4628008" y="913954"/>
-            <a:ext cx="3663182" cy="923330"/>
+            <a:off x="743608" y="779685"/>
+            <a:ext cx="2236510" cy="584775"/>
           </a:xfrm>
           <a:prstGeom prst="rect">
             <a:avLst/>
@@ -4861,17 +5268,637 @@
           <a:lstStyle/>
           <a:p>
             <a:r>
-              <a:rPr lang="zh-CN" altLang="en-US" sz="5400" b="1" dirty="0"/>
-              <a:t>感谢收听！</a:t>
-            </a:r>
-            <a:endParaRPr lang="en-US" altLang="zh-CN" sz="5400" b="1" dirty="0"/>
-          </a:p>
-        </p:txBody>
-      </p:sp>
+              <a:rPr lang="zh-CN" altLang="en-US" sz="3200" dirty="0"/>
+              <a:t>结果实例：</a:t>
+            </a:r>
+            <a:endParaRPr lang="en-US" altLang="zh-CN" sz="3200" dirty="0"/>
+          </a:p>
+        </p:txBody>
+      </p:sp>
+      <p:pic>
+        <p:nvPicPr>
+          <p:cNvPr id="2" name="图片 1">
+            <a:extLst>
+              <a:ext uri="{FF2B5EF4-FFF2-40B4-BE49-F238E27FC236}">
+                <a16:creationId xmlns:a16="http://schemas.microsoft.com/office/drawing/2014/main" id="{0F176B05-DE9E-524A-B8D8-B580CFAE36BA}"/>
+              </a:ext>
+            </a:extLst>
+          </p:cNvPr>
+          <p:cNvPicPr>
+            <a:picLocks noChangeAspect="1"/>
+          </p:cNvPicPr>
+          <p:nvPr/>
+        </p:nvPicPr>
+        <p:blipFill>
+          <a:blip r:embed="rId2"/>
+          <a:stretch>
+            <a:fillRect/>
+          </a:stretch>
+        </p:blipFill>
+        <p:spPr>
+          <a:xfrm>
+            <a:off x="2150619" y="1484775"/>
+            <a:ext cx="7697203" cy="4772625"/>
+          </a:xfrm>
+          <a:prstGeom prst="roundRect">
+            <a:avLst>
+              <a:gd name="adj" fmla="val 0"/>
+            </a:avLst>
+          </a:prstGeom>
+          <a:solidFill>
+            <a:srgbClr val="FFFFFF">
+              <a:shade val="85000"/>
+            </a:srgbClr>
+          </a:solidFill>
+          <a:ln>
+            <a:noFill/>
+          </a:ln>
+          <a:effectLst>
+            <a:reflection blurRad="12700" stA="38000" endPos="28000" dist="5000" dir="5400000" sy="-100000" algn="bl" rotWithShape="0"/>
+          </a:effectLst>
+        </p:spPr>
+      </p:pic>
     </p:spTree>
     <p:extLst>
       <p:ext uri="{BB962C8B-B14F-4D97-AF65-F5344CB8AC3E}">
-        <p14:creationId xmlns:p14="http://schemas.microsoft.com/office/powerpoint/2010/main" val="4206972790"/>
+        <p14:creationId xmlns:p14="http://schemas.microsoft.com/office/powerpoint/2010/main" val="2655326586"/>
+      </p:ext>
+    </p:extLst>
+  </p:cSld>
+  <p:clrMapOvr>
+    <a:masterClrMapping/>
+  </p:clrMapOvr>
+</p:sld>
+</file>
+
+<file path=ppt/slides/slide16.xml><?xml version="1.0" encoding="utf-8"?>
+<p:sld xmlns:a="http://schemas.openxmlformats.org/drawingml/2006/main" xmlns:r="http://schemas.openxmlformats.org/officeDocument/2006/relationships" xmlns:p="http://schemas.openxmlformats.org/presentationml/2006/main">
+  <p:cSld>
+    <p:spTree>
+      <p:nvGrpSpPr>
+        <p:cNvPr id="1" name=""/>
+        <p:cNvGrpSpPr/>
+        <p:nvPr/>
+      </p:nvGrpSpPr>
+      <p:grpSpPr>
+        <a:xfrm>
+          <a:off x="0" y="0"/>
+          <a:ext cx="0" cy="0"/>
+          <a:chOff x="0" y="0"/>
+          <a:chExt cx="0" cy="0"/>
+        </a:xfrm>
+      </p:grpSpPr>
+      <p:sp>
+        <p:nvSpPr>
+          <p:cNvPr id="4" name="文本框 3">
+            <a:extLst>
+              <a:ext uri="{FF2B5EF4-FFF2-40B4-BE49-F238E27FC236}">
+                <a16:creationId xmlns:a16="http://schemas.microsoft.com/office/drawing/2014/main" id="{89689C59-38D4-4289-BDB3-8DB511A5181D}"/>
+              </a:ext>
+            </a:extLst>
+          </p:cNvPr>
+          <p:cNvSpPr txBox="1"/>
+          <p:nvPr/>
+        </p:nvSpPr>
+        <p:spPr>
+          <a:xfrm>
+            <a:off x="788409" y="379575"/>
+            <a:ext cx="11339744" cy="400110"/>
+          </a:xfrm>
+          <a:prstGeom prst="rect">
+            <a:avLst/>
+          </a:prstGeom>
+          <a:noFill/>
+        </p:spPr>
+        <p:txBody>
+          <a:bodyPr wrap="square" rtlCol="0">
+            <a:spAutoFit/>
+          </a:bodyPr>
+          <a:lstStyle/>
+          <a:p>
+            <a:r>
+              <a:rPr lang="en" altLang="zh-CN" sz="2000" dirty="0"/>
+              <a:t>Automatic detection and interpretation of nominal metaphor based on the</a:t>
+            </a:r>
+            <a:r>
+              <a:rPr lang="zh-CN" altLang="en-US" sz="2000" dirty="0"/>
+              <a:t> </a:t>
+            </a:r>
+            <a:r>
+              <a:rPr lang="en" altLang="zh-CN" sz="2000" dirty="0"/>
+              <a:t>theory of meaning</a:t>
+            </a:r>
+            <a:r>
+              <a:rPr lang="zh-CN" altLang="en-US" sz="2000" dirty="0"/>
+              <a:t>：</a:t>
+            </a:r>
+            <a:endParaRPr lang="en-US" altLang="zh-CN" sz="2000" dirty="0"/>
+          </a:p>
+        </p:txBody>
+      </p:sp>
+      <p:sp>
+        <p:nvSpPr>
+          <p:cNvPr id="5" name="文本框 4">
+            <a:extLst>
+              <a:ext uri="{FF2B5EF4-FFF2-40B4-BE49-F238E27FC236}">
+                <a16:creationId xmlns:a16="http://schemas.microsoft.com/office/drawing/2014/main" id="{6BD98EA0-3AA0-9F4B-AC9A-17C0AD6822B9}"/>
+              </a:ext>
+            </a:extLst>
+          </p:cNvPr>
+          <p:cNvSpPr txBox="1"/>
+          <p:nvPr/>
+        </p:nvSpPr>
+        <p:spPr>
+          <a:xfrm>
+            <a:off x="743608" y="779685"/>
+            <a:ext cx="3057247" cy="584775"/>
+          </a:xfrm>
+          <a:prstGeom prst="rect">
+            <a:avLst/>
+          </a:prstGeom>
+          <a:noFill/>
+        </p:spPr>
+        <p:txBody>
+          <a:bodyPr wrap="none" rtlCol="0">
+            <a:spAutoFit/>
+          </a:bodyPr>
+          <a:lstStyle/>
+          <a:p>
+            <a:r>
+              <a:rPr lang="zh-CN" altLang="en-US" sz="3200" dirty="0"/>
+              <a:t>属性转移公式：</a:t>
+            </a:r>
+            <a:endParaRPr lang="en-US" altLang="zh-CN" sz="3200" dirty="0"/>
+          </a:p>
+        </p:txBody>
+      </p:sp>
+      <p:pic>
+        <p:nvPicPr>
+          <p:cNvPr id="2" name="图片 1">
+            <a:extLst>
+              <a:ext uri="{FF2B5EF4-FFF2-40B4-BE49-F238E27FC236}">
+                <a16:creationId xmlns:a16="http://schemas.microsoft.com/office/drawing/2014/main" id="{0F176B05-DE9E-524A-B8D8-B580CFAE36BA}"/>
+              </a:ext>
+            </a:extLst>
+          </p:cNvPr>
+          <p:cNvPicPr>
+            <a:picLocks noChangeAspect="1"/>
+          </p:cNvPicPr>
+          <p:nvPr/>
+        </p:nvPicPr>
+        <p:blipFill>
+          <a:blip r:embed="rId2"/>
+          <a:stretch>
+            <a:fillRect/>
+          </a:stretch>
+        </p:blipFill>
+        <p:spPr>
+          <a:xfrm>
+            <a:off x="3371850" y="1739900"/>
+            <a:ext cx="5448300" cy="3378200"/>
+          </a:xfrm>
+          <a:prstGeom prst="rect">
+            <a:avLst/>
+          </a:prstGeom>
+        </p:spPr>
+      </p:pic>
+    </p:spTree>
+    <p:extLst>
+      <p:ext uri="{BB962C8B-B14F-4D97-AF65-F5344CB8AC3E}">
+        <p14:creationId xmlns:p14="http://schemas.microsoft.com/office/powerpoint/2010/main" val="3211345510"/>
+      </p:ext>
+    </p:extLst>
+  </p:cSld>
+  <p:clrMapOvr>
+    <a:masterClrMapping/>
+  </p:clrMapOvr>
+</p:sld>
+</file>
+
+<file path=ppt/slides/slide17.xml><?xml version="1.0" encoding="utf-8"?>
+<p:sld xmlns:a="http://schemas.openxmlformats.org/drawingml/2006/main" xmlns:r="http://schemas.openxmlformats.org/officeDocument/2006/relationships" xmlns:p="http://schemas.openxmlformats.org/presentationml/2006/main">
+  <p:cSld>
+    <p:spTree>
+      <p:nvGrpSpPr>
+        <p:cNvPr id="1" name=""/>
+        <p:cNvGrpSpPr/>
+        <p:nvPr/>
+      </p:nvGrpSpPr>
+      <p:grpSpPr>
+        <a:xfrm>
+          <a:off x="0" y="0"/>
+          <a:ext cx="0" cy="0"/>
+          <a:chOff x="0" y="0"/>
+          <a:chExt cx="0" cy="0"/>
+        </a:xfrm>
+      </p:grpSpPr>
+      <p:sp>
+        <p:nvSpPr>
+          <p:cNvPr id="6" name="文本框 5">
+            <a:extLst>
+              <a:ext uri="{FF2B5EF4-FFF2-40B4-BE49-F238E27FC236}">
+                <a16:creationId xmlns:a16="http://schemas.microsoft.com/office/drawing/2014/main" id="{F1A26789-1B54-4618-9B03-77CEA71B450F}"/>
+              </a:ext>
+            </a:extLst>
+          </p:cNvPr>
+          <p:cNvSpPr txBox="1"/>
+          <p:nvPr/>
+        </p:nvSpPr>
+        <p:spPr>
+          <a:xfrm>
+            <a:off x="1158357" y="3167390"/>
+            <a:ext cx="10455470" cy="523220"/>
+          </a:xfrm>
+          <a:prstGeom prst="rect">
+            <a:avLst/>
+          </a:prstGeom>
+          <a:noFill/>
+        </p:spPr>
+        <p:txBody>
+          <a:bodyPr wrap="square" rtlCol="0">
+            <a:spAutoFit/>
+          </a:bodyPr>
+          <a:lstStyle/>
+          <a:p>
+            <a:r>
+              <a:rPr lang="zh-CN" altLang="en-US" sz="2800" dirty="0"/>
+              <a:t>下面我们来讨论第二篇</a:t>
+            </a:r>
+            <a:r>
+              <a:rPr lang="en-US" altLang="zh-CN" sz="2800" dirty="0" err="1"/>
+              <a:t>Su</a:t>
+            </a:r>
+            <a:r>
+              <a:rPr lang="en-US" altLang="zh-CN" sz="2800" dirty="0"/>
+              <a:t> Chang</a:t>
+            </a:r>
+            <a:r>
+              <a:rPr lang="zh-CN" altLang="en-US" sz="2800" dirty="0"/>
+              <a:t>论文。</a:t>
+            </a:r>
+            <a:endParaRPr lang="en-US" altLang="zh-CN" sz="2800" dirty="0"/>
+          </a:p>
+        </p:txBody>
+      </p:sp>
+    </p:spTree>
+    <p:extLst>
+      <p:ext uri="{BB962C8B-B14F-4D97-AF65-F5344CB8AC3E}">
+        <p14:creationId xmlns:p14="http://schemas.microsoft.com/office/powerpoint/2010/main" val="663644618"/>
+      </p:ext>
+    </p:extLst>
+  </p:cSld>
+  <p:clrMapOvr>
+    <a:masterClrMapping/>
+  </p:clrMapOvr>
+</p:sld>
+</file>
+
+<file path=ppt/slides/slide18.xml><?xml version="1.0" encoding="utf-8"?>
+<p:sld xmlns:a="http://schemas.openxmlformats.org/drawingml/2006/main" xmlns:r="http://schemas.openxmlformats.org/officeDocument/2006/relationships" xmlns:p="http://schemas.openxmlformats.org/presentationml/2006/main">
+  <p:cSld>
+    <p:spTree>
+      <p:nvGrpSpPr>
+        <p:cNvPr id="1" name=""/>
+        <p:cNvGrpSpPr/>
+        <p:nvPr/>
+      </p:nvGrpSpPr>
+      <p:grpSpPr>
+        <a:xfrm>
+          <a:off x="0" y="0"/>
+          <a:ext cx="0" cy="0"/>
+          <a:chOff x="0" y="0"/>
+          <a:chExt cx="0" cy="0"/>
+        </a:xfrm>
+      </p:grpSpPr>
+      <p:sp>
+        <p:nvSpPr>
+          <p:cNvPr id="4" name="文本框 3">
+            <a:extLst>
+              <a:ext uri="{FF2B5EF4-FFF2-40B4-BE49-F238E27FC236}">
+                <a16:creationId xmlns:a16="http://schemas.microsoft.com/office/drawing/2014/main" id="{89689C59-38D4-4289-BDB3-8DB511A5181D}"/>
+              </a:ext>
+            </a:extLst>
+          </p:cNvPr>
+          <p:cNvSpPr txBox="1"/>
+          <p:nvPr/>
+        </p:nvSpPr>
+        <p:spPr>
+          <a:xfrm>
+            <a:off x="852256" y="319597"/>
+            <a:ext cx="8747908" cy="400110"/>
+          </a:xfrm>
+          <a:prstGeom prst="rect">
+            <a:avLst/>
+          </a:prstGeom>
+          <a:noFill/>
+        </p:spPr>
+        <p:txBody>
+          <a:bodyPr wrap="none" rtlCol="0">
+            <a:spAutoFit/>
+          </a:bodyPr>
+          <a:lstStyle/>
+          <a:p>
+            <a:r>
+              <a:rPr lang="en" altLang="zh-CN" sz="2000" dirty="0"/>
+              <a:t>Latent semantic similarity based interpretation of Chinese metaphors</a:t>
+            </a:r>
+            <a:r>
+              <a:rPr lang="zh-CN" altLang="en-US" sz="2000" dirty="0"/>
+              <a:t>：</a:t>
+            </a:r>
+            <a:endParaRPr lang="en-US" altLang="zh-CN" sz="2000" dirty="0"/>
+          </a:p>
+        </p:txBody>
+      </p:sp>
+      <p:sp>
+        <p:nvSpPr>
+          <p:cNvPr id="6" name="文本框 5">
+            <a:extLst>
+              <a:ext uri="{FF2B5EF4-FFF2-40B4-BE49-F238E27FC236}">
+                <a16:creationId xmlns:a16="http://schemas.microsoft.com/office/drawing/2014/main" id="{F1A26789-1B54-4618-9B03-77CEA71B450F}"/>
+              </a:ext>
+            </a:extLst>
+          </p:cNvPr>
+          <p:cNvSpPr txBox="1"/>
+          <p:nvPr/>
+        </p:nvSpPr>
+        <p:spPr>
+          <a:xfrm>
+            <a:off x="1230546" y="2736502"/>
+            <a:ext cx="10455470" cy="1384995"/>
+          </a:xfrm>
+          <a:prstGeom prst="rect">
+            <a:avLst/>
+          </a:prstGeom>
+          <a:noFill/>
+        </p:spPr>
+        <p:txBody>
+          <a:bodyPr wrap="square" rtlCol="0">
+            <a:spAutoFit/>
+          </a:bodyPr>
+          <a:lstStyle/>
+          <a:p>
+            <a:pPr marL="514350" indent="-514350">
+              <a:buAutoNum type="arabicPeriod"/>
+            </a:pPr>
+            <a:r>
+              <a:rPr lang="zh-CN" altLang="en-US" sz="2800" dirty="0"/>
+              <a:t>对于每一个隐喻句，提取源域和目标域的概念特征</a:t>
+            </a:r>
+            <a:endParaRPr lang="en-US" altLang="zh-CN" sz="2800" dirty="0"/>
+          </a:p>
+          <a:p>
+            <a:pPr marL="514350" indent="-514350">
+              <a:buAutoNum type="arabicPeriod"/>
+            </a:pPr>
+            <a:r>
+              <a:rPr lang="zh-CN" altLang="en-US" sz="2800" dirty="0"/>
+              <a:t>基于</a:t>
+            </a:r>
+            <a:r>
+              <a:rPr lang="en-US" altLang="zh-CN" sz="2800" dirty="0"/>
+              <a:t>WordNet</a:t>
+            </a:r>
+            <a:r>
+              <a:rPr lang="zh-CN" altLang="en-US" sz="2800" dirty="0"/>
+              <a:t> 对于提取出的特征做同义扩展</a:t>
+            </a:r>
+            <a:endParaRPr lang="en-US" altLang="zh-CN" sz="2800" dirty="0"/>
+          </a:p>
+          <a:p>
+            <a:pPr marL="514350" indent="-514350">
+              <a:buAutoNum type="arabicPeriod"/>
+            </a:pPr>
+            <a:r>
+              <a:rPr lang="zh-CN" altLang="en-US" sz="2800" dirty="0"/>
+              <a:t>用</a:t>
+            </a:r>
+            <a:r>
+              <a:rPr lang="en-US" altLang="zh-CN" sz="2800" dirty="0"/>
+              <a:t>Google</a:t>
+            </a:r>
+            <a:r>
+              <a:rPr lang="zh-CN" altLang="en-US" sz="2800" dirty="0"/>
+              <a:t> </a:t>
+            </a:r>
+            <a:r>
+              <a:rPr lang="en-US" altLang="zh-CN" sz="2800" dirty="0"/>
+              <a:t>Distance </a:t>
+            </a:r>
+            <a:r>
+              <a:rPr lang="zh-CN" altLang="en-US" sz="2800" dirty="0"/>
+              <a:t>来对理解结果做排序，选出最优解</a:t>
+            </a:r>
+          </a:p>
+        </p:txBody>
+      </p:sp>
+      <p:sp>
+        <p:nvSpPr>
+          <p:cNvPr id="5" name="文本框 4">
+            <a:extLst>
+              <a:ext uri="{FF2B5EF4-FFF2-40B4-BE49-F238E27FC236}">
+                <a16:creationId xmlns:a16="http://schemas.microsoft.com/office/drawing/2014/main" id="{6BD98EA0-3AA0-9F4B-AC9A-17C0AD6822B9}"/>
+              </a:ext>
+            </a:extLst>
+          </p:cNvPr>
+          <p:cNvSpPr txBox="1"/>
+          <p:nvPr/>
+        </p:nvSpPr>
+        <p:spPr>
+          <a:xfrm>
+            <a:off x="852256" y="779685"/>
+            <a:ext cx="2236510" cy="584775"/>
+          </a:xfrm>
+          <a:prstGeom prst="rect">
+            <a:avLst/>
+          </a:prstGeom>
+          <a:noFill/>
+        </p:spPr>
+        <p:txBody>
+          <a:bodyPr wrap="none" rtlCol="0">
+            <a:spAutoFit/>
+          </a:bodyPr>
+          <a:lstStyle/>
+          <a:p>
+            <a:r>
+              <a:rPr lang="zh-CN" altLang="en-US" sz="3200" dirty="0"/>
+              <a:t>模型步骤：</a:t>
+            </a:r>
+            <a:endParaRPr lang="en-US" altLang="zh-CN" sz="3200" dirty="0"/>
+          </a:p>
+        </p:txBody>
+      </p:sp>
+    </p:spTree>
+    <p:extLst>
+      <p:ext uri="{BB962C8B-B14F-4D97-AF65-F5344CB8AC3E}">
+        <p14:creationId xmlns:p14="http://schemas.microsoft.com/office/powerpoint/2010/main" val="3782646572"/>
+      </p:ext>
+    </p:extLst>
+  </p:cSld>
+  <p:clrMapOvr>
+    <a:masterClrMapping/>
+  </p:clrMapOvr>
+</p:sld>
+</file>
+
+<file path=ppt/slides/slide19.xml><?xml version="1.0" encoding="utf-8"?>
+<p:sld xmlns:a="http://schemas.openxmlformats.org/drawingml/2006/main" xmlns:r="http://schemas.openxmlformats.org/officeDocument/2006/relationships" xmlns:p="http://schemas.openxmlformats.org/presentationml/2006/main">
+  <p:cSld>
+    <p:spTree>
+      <p:nvGrpSpPr>
+        <p:cNvPr id="1" name=""/>
+        <p:cNvGrpSpPr/>
+        <p:nvPr/>
+      </p:nvGrpSpPr>
+      <p:grpSpPr>
+        <a:xfrm>
+          <a:off x="0" y="0"/>
+          <a:ext cx="0" cy="0"/>
+          <a:chOff x="0" y="0"/>
+          <a:chExt cx="0" cy="0"/>
+        </a:xfrm>
+      </p:grpSpPr>
+      <p:sp>
+        <p:nvSpPr>
+          <p:cNvPr id="3" name="文本框 2">
+            <a:extLst>
+              <a:ext uri="{FF2B5EF4-FFF2-40B4-BE49-F238E27FC236}">
+                <a16:creationId xmlns:a16="http://schemas.microsoft.com/office/drawing/2014/main" id="{934B47D1-33D4-4E4A-8626-897FB2BF44D9}"/>
+              </a:ext>
+            </a:extLst>
+          </p:cNvPr>
+          <p:cNvSpPr txBox="1"/>
+          <p:nvPr/>
+        </p:nvSpPr>
+        <p:spPr>
+          <a:xfrm>
+            <a:off x="927208" y="426720"/>
+            <a:ext cx="10853312" cy="5940088"/>
+          </a:xfrm>
+          <a:prstGeom prst="rect">
+            <a:avLst/>
+          </a:prstGeom>
+          <a:noFill/>
+        </p:spPr>
+        <p:txBody>
+          <a:bodyPr wrap="square" rtlCol="0">
+            <a:spAutoFit/>
+          </a:bodyPr>
+          <a:lstStyle/>
+          <a:p>
+            <a:r>
+              <a:rPr lang="zh-CN" altLang="en-US" sz="3600" dirty="0"/>
+              <a:t>隐喻理解：使用或构建新型知识库</a:t>
+            </a:r>
+            <a:endParaRPr lang="en-US" altLang="zh-CN" sz="3600" dirty="0"/>
+          </a:p>
+          <a:p>
+            <a:endParaRPr lang="en-US" altLang="zh-CN" sz="3600" dirty="0"/>
+          </a:p>
+          <a:p>
+            <a:pPr marL="742950" indent="-742950">
+              <a:buAutoNum type="arabicPeriod"/>
+            </a:pPr>
+            <a:r>
+              <a:rPr lang="en-US" altLang="zh-CN" sz="2800" dirty="0"/>
+              <a:t>WordNet</a:t>
+            </a:r>
+            <a:r>
+              <a:rPr lang="zh-CN" altLang="en-US" sz="2800" dirty="0"/>
+              <a:t>在隐喻识别和隐喻理解中被广泛地用于捕捉词汇语义</a:t>
+            </a:r>
+            <a:endParaRPr lang="en-US" altLang="zh-CN" sz="2800" dirty="0"/>
+          </a:p>
+          <a:p>
+            <a:r>
+              <a:rPr lang="en-US" altLang="zh-CN" sz="2800" dirty="0"/>
+              <a:t>		</a:t>
+            </a:r>
+            <a:r>
+              <a:rPr lang="zh-CN" altLang="en-US" sz="2800" dirty="0">
+                <a:solidFill>
+                  <a:srgbClr val="FFC000"/>
+                </a:solidFill>
+              </a:rPr>
+              <a:t>为什么呢？</a:t>
+            </a:r>
+            <a:endParaRPr lang="en-US" altLang="zh-CN" sz="2800" dirty="0">
+              <a:solidFill>
+                <a:srgbClr val="FFC000"/>
+              </a:solidFill>
+            </a:endParaRPr>
+          </a:p>
+          <a:p>
+            <a:r>
+              <a:rPr lang="en-US" altLang="zh-CN" sz="2800" dirty="0"/>
+              <a:t>		</a:t>
+            </a:r>
+            <a:r>
+              <a:rPr lang="zh-CN" altLang="en-US" sz="2800" dirty="0"/>
+              <a:t>因为同义词概念之间由语义和词法相互连接，体系简单，层级</a:t>
+            </a:r>
+            <a:r>
+              <a:rPr lang="en-US" altLang="zh-CN" sz="2800" dirty="0"/>
+              <a:t>		</a:t>
+            </a:r>
+            <a:r>
+              <a:rPr lang="zh-CN" altLang="en-US" sz="2800" dirty="0"/>
+              <a:t>关系明显，</a:t>
+            </a:r>
+            <a:r>
+              <a:rPr lang="en-US" altLang="zh-CN" sz="2800" dirty="0"/>
+              <a:t>WordNet</a:t>
+            </a:r>
+            <a:r>
+              <a:rPr lang="zh-CN" altLang="en-US" sz="2800" dirty="0"/>
+              <a:t>中的单词距离也可以用来衡量单词的语义</a:t>
+            </a:r>
+            <a:r>
+              <a:rPr lang="en-US" altLang="zh-CN" sz="2800" dirty="0"/>
+              <a:t>		</a:t>
+            </a:r>
+            <a:r>
+              <a:rPr lang="zh-CN" altLang="en-US" sz="2800" dirty="0"/>
+              <a:t>关联性！</a:t>
+            </a:r>
+            <a:endParaRPr lang="en-US" altLang="zh-CN" sz="2800" dirty="0"/>
+          </a:p>
+          <a:p>
+            <a:endParaRPr lang="en-US" altLang="zh-CN" sz="2800" dirty="0"/>
+          </a:p>
+          <a:p>
+            <a:pPr marL="514350" indent="-514350">
+              <a:buAutoNum type="arabicPeriod" startAt="2"/>
+            </a:pPr>
+            <a:r>
+              <a:rPr lang="en-US" altLang="zh-CN" sz="2800" dirty="0" err="1"/>
+              <a:t>VerbNet</a:t>
+            </a:r>
+            <a:r>
+              <a:rPr lang="zh-CN" altLang="en-US" sz="2800" dirty="0"/>
+              <a:t>目前最大的英文在线动词词汇库。数据库中的每个动词类都用题元角色描述、描述参数的限制条件以及由语法和语义信息构成的框架等来描述。</a:t>
+            </a:r>
+            <a:endParaRPr lang="en-US" altLang="zh-CN" sz="2800" dirty="0"/>
+          </a:p>
+          <a:p>
+            <a:pPr marL="514350" indent="-514350">
+              <a:buAutoNum type="arabicPeriod" startAt="2"/>
+            </a:pPr>
+            <a:endParaRPr lang="en-US" altLang="zh-CN" sz="2800" dirty="0"/>
+          </a:p>
+          <a:p>
+            <a:r>
+              <a:rPr lang="zh-CN" altLang="en-US" sz="2800" dirty="0"/>
+              <a:t>两个知识库都有明显的层级关系。</a:t>
+            </a:r>
+            <a:endParaRPr lang="en-US" altLang="zh-CN" sz="2800" dirty="0"/>
+          </a:p>
+        </p:txBody>
+      </p:sp>
+    </p:spTree>
+    <p:extLst>
+      <p:ext uri="{BB962C8B-B14F-4D97-AF65-F5344CB8AC3E}">
+        <p14:creationId xmlns:p14="http://schemas.microsoft.com/office/powerpoint/2010/main" val="473480215"/>
       </p:ext>
     </p:extLst>
   </p:cSld>
@@ -5128,6 +6155,728 @@
     <p:extLst>
       <p:ext uri="{BB962C8B-B14F-4D97-AF65-F5344CB8AC3E}">
         <p14:creationId xmlns:p14="http://schemas.microsoft.com/office/powerpoint/2010/main" val="2016387134"/>
+      </p:ext>
+    </p:extLst>
+  </p:cSld>
+  <p:clrMapOvr>
+    <a:masterClrMapping/>
+  </p:clrMapOvr>
+</p:sld>
+</file>
+
+<file path=ppt/slides/slide20.xml><?xml version="1.0" encoding="utf-8"?>
+<p:sld xmlns:a="http://schemas.openxmlformats.org/drawingml/2006/main" xmlns:r="http://schemas.openxmlformats.org/officeDocument/2006/relationships" xmlns:p="http://schemas.openxmlformats.org/presentationml/2006/main">
+  <p:cSld>
+    <p:spTree>
+      <p:nvGrpSpPr>
+        <p:cNvPr id="1" name=""/>
+        <p:cNvGrpSpPr/>
+        <p:nvPr/>
+      </p:nvGrpSpPr>
+      <p:grpSpPr>
+        <a:xfrm>
+          <a:off x="0" y="0"/>
+          <a:ext cx="0" cy="0"/>
+          <a:chOff x="0" y="0"/>
+          <a:chExt cx="0" cy="0"/>
+        </a:xfrm>
+      </p:grpSpPr>
+      <p:sp>
+        <p:nvSpPr>
+          <p:cNvPr id="14" name="文本框 13">
+            <a:extLst>
+              <a:ext uri="{FF2B5EF4-FFF2-40B4-BE49-F238E27FC236}">
+                <a16:creationId xmlns:a16="http://schemas.microsoft.com/office/drawing/2014/main" id="{4C7A5F77-9114-4C49-8DFA-2D786179D15E}"/>
+              </a:ext>
+            </a:extLst>
+          </p:cNvPr>
+          <p:cNvSpPr txBox="1"/>
+          <p:nvPr/>
+        </p:nvSpPr>
+        <p:spPr>
+          <a:xfrm>
+            <a:off x="269356" y="213360"/>
+            <a:ext cx="3723524" cy="461665"/>
+          </a:xfrm>
+          <a:prstGeom prst="rect">
+            <a:avLst/>
+          </a:prstGeom>
+          <a:noFill/>
+        </p:spPr>
+        <p:txBody>
+          <a:bodyPr wrap="square" rtlCol="0">
+            <a:spAutoFit/>
+          </a:bodyPr>
+          <a:lstStyle/>
+          <a:p>
+            <a:r>
+              <a:rPr lang="en-US" altLang="zh-CN" sz="2400" dirty="0">
+                <a:latin typeface="微软雅黑" panose="020B0503020204020204" pitchFamily="34" charset="-122"/>
+                <a:ea typeface="微软雅黑" panose="020B0503020204020204" pitchFamily="34" charset="-122"/>
+              </a:rPr>
+              <a:t>WordNet </a:t>
+            </a:r>
+            <a:r>
+              <a:rPr lang="zh-CN" altLang="en-US" sz="2400" dirty="0">
+                <a:latin typeface="微软雅黑" panose="020B0503020204020204" pitchFamily="34" charset="-122"/>
+                <a:ea typeface="微软雅黑" panose="020B0503020204020204" pitchFamily="34" charset="-122"/>
+              </a:rPr>
+              <a:t>玩一玩 看一看</a:t>
+            </a:r>
+            <a:endParaRPr lang="en-US" altLang="zh-CN" sz="2400" dirty="0">
+              <a:latin typeface="微软雅黑" panose="020B0503020204020204" pitchFamily="34" charset="-122"/>
+              <a:ea typeface="微软雅黑" panose="020B0503020204020204" pitchFamily="34" charset="-122"/>
+            </a:endParaRPr>
+          </a:p>
+        </p:txBody>
+      </p:sp>
+      <p:pic>
+        <p:nvPicPr>
+          <p:cNvPr id="2" name="图片 1">
+            <a:extLst>
+              <a:ext uri="{FF2B5EF4-FFF2-40B4-BE49-F238E27FC236}">
+                <a16:creationId xmlns:a16="http://schemas.microsoft.com/office/drawing/2014/main" id="{36B8EFB8-CFB4-43D5-A2FC-0F15CB6F1E6F}"/>
+              </a:ext>
+            </a:extLst>
+          </p:cNvPr>
+          <p:cNvPicPr>
+            <a:picLocks noChangeAspect="1"/>
+          </p:cNvPicPr>
+          <p:nvPr/>
+        </p:nvPicPr>
+        <p:blipFill>
+          <a:blip r:embed="rId2"/>
+          <a:stretch>
+            <a:fillRect/>
+          </a:stretch>
+        </p:blipFill>
+        <p:spPr>
+          <a:xfrm>
+            <a:off x="5567912" y="545404"/>
+            <a:ext cx="4620027" cy="5524839"/>
+          </a:xfrm>
+          <a:prstGeom prst="rect">
+            <a:avLst/>
+          </a:prstGeom>
+          <a:ln>
+            <a:noFill/>
+          </a:ln>
+          <a:effectLst>
+            <a:outerShdw blurRad="292100" dist="139700" dir="2700000" algn="tl" rotWithShape="0">
+              <a:srgbClr val="333333">
+                <a:alpha val="65000"/>
+              </a:srgbClr>
+            </a:outerShdw>
+          </a:effectLst>
+        </p:spPr>
+      </p:pic>
+      <p:sp>
+        <p:nvSpPr>
+          <p:cNvPr id="3" name="矩形 2">
+            <a:extLst>
+              <a:ext uri="{FF2B5EF4-FFF2-40B4-BE49-F238E27FC236}">
+                <a16:creationId xmlns:a16="http://schemas.microsoft.com/office/drawing/2014/main" id="{29148177-998B-47C6-A413-E88B2AF2FDFA}"/>
+              </a:ext>
+            </a:extLst>
+          </p:cNvPr>
+          <p:cNvSpPr/>
+          <p:nvPr/>
+        </p:nvSpPr>
+        <p:spPr>
+          <a:xfrm>
+            <a:off x="5231368" y="6356065"/>
+            <a:ext cx="5293116" cy="369332"/>
+          </a:xfrm>
+          <a:prstGeom prst="rect">
+            <a:avLst/>
+          </a:prstGeom>
+        </p:spPr>
+        <p:txBody>
+          <a:bodyPr wrap="none">
+            <a:spAutoFit/>
+          </a:bodyPr>
+          <a:lstStyle/>
+          <a:p>
+            <a:r>
+              <a:rPr lang="en-US" altLang="zh-CN" dirty="0">
+                <a:solidFill>
+                  <a:srgbClr val="6795B5"/>
+                </a:solidFill>
+                <a:latin typeface="Microsoft YaHei" panose="020B0503020204020204" pitchFamily="34" charset="-122"/>
+                <a:ea typeface="Microsoft YaHei" panose="020B0503020204020204" pitchFamily="34" charset="-122"/>
+                <a:hlinkClick r:id="rId3"/>
+              </a:rPr>
+              <a:t>http://wordnetweb.princeton.edu/perl/webwn</a:t>
+            </a:r>
+            <a:endParaRPr lang="zh-CN" altLang="en-US" dirty="0"/>
+          </a:p>
+        </p:txBody>
+      </p:sp>
+      <p:sp>
+        <p:nvSpPr>
+          <p:cNvPr id="4" name="矩形 3">
+            <a:extLst>
+              <a:ext uri="{FF2B5EF4-FFF2-40B4-BE49-F238E27FC236}">
+                <a16:creationId xmlns:a16="http://schemas.microsoft.com/office/drawing/2014/main" id="{33E257FD-527B-4EFF-9367-CD4693274594}"/>
+              </a:ext>
+            </a:extLst>
+          </p:cNvPr>
+          <p:cNvSpPr/>
+          <p:nvPr/>
+        </p:nvSpPr>
+        <p:spPr>
+          <a:xfrm>
+            <a:off x="878956" y="2492216"/>
+            <a:ext cx="3561197" cy="1631216"/>
+          </a:xfrm>
+          <a:prstGeom prst="rect">
+            <a:avLst/>
+          </a:prstGeom>
+        </p:spPr>
+        <p:txBody>
+          <a:bodyPr wrap="square">
+            <a:spAutoFit/>
+          </a:bodyPr>
+          <a:lstStyle/>
+          <a:p>
+            <a:r>
+              <a:rPr lang="zh-CN" altLang="en-US" sz="2000" dirty="0">
+                <a:solidFill>
+                  <a:srgbClr val="4D4D4D"/>
+                </a:solidFill>
+                <a:latin typeface="Microsoft YaHei" panose="020B0503020204020204" pitchFamily="34" charset="-122"/>
+                <a:ea typeface="Microsoft YaHei" panose="020B0503020204020204" pitchFamily="34" charset="-122"/>
+              </a:rPr>
+              <a:t>名词，动词，形容词和副词各自被组织成一个同义词的网络，每个同义词集合都代表一个基本的语义概念，并且这些集合之间也由各种关系连接。</a:t>
+            </a:r>
+            <a:endParaRPr lang="zh-CN" altLang="en-US" sz="2000" dirty="0"/>
+          </a:p>
+        </p:txBody>
+      </p:sp>
+    </p:spTree>
+    <p:extLst>
+      <p:ext uri="{BB962C8B-B14F-4D97-AF65-F5344CB8AC3E}">
+        <p14:creationId xmlns:p14="http://schemas.microsoft.com/office/powerpoint/2010/main" val="2606029402"/>
+      </p:ext>
+    </p:extLst>
+  </p:cSld>
+  <p:clrMapOvr>
+    <a:masterClrMapping/>
+  </p:clrMapOvr>
+</p:sld>
+</file>
+
+<file path=ppt/slides/slide21.xml><?xml version="1.0" encoding="utf-8"?>
+<p:sld xmlns:a="http://schemas.openxmlformats.org/drawingml/2006/main" xmlns:r="http://schemas.openxmlformats.org/officeDocument/2006/relationships" xmlns:p="http://schemas.openxmlformats.org/presentationml/2006/main">
+  <p:cSld>
+    <p:spTree>
+      <p:nvGrpSpPr>
+        <p:cNvPr id="1" name=""/>
+        <p:cNvGrpSpPr/>
+        <p:nvPr/>
+      </p:nvGrpSpPr>
+      <p:grpSpPr>
+        <a:xfrm>
+          <a:off x="0" y="0"/>
+          <a:ext cx="0" cy="0"/>
+          <a:chOff x="0" y="0"/>
+          <a:chExt cx="0" cy="0"/>
+        </a:xfrm>
+      </p:grpSpPr>
+      <p:sp>
+        <p:nvSpPr>
+          <p:cNvPr id="3" name="文本框 2">
+            <a:extLst>
+              <a:ext uri="{FF2B5EF4-FFF2-40B4-BE49-F238E27FC236}">
+                <a16:creationId xmlns:a16="http://schemas.microsoft.com/office/drawing/2014/main" id="{934B47D1-33D4-4E4A-8626-897FB2BF44D9}"/>
+              </a:ext>
+            </a:extLst>
+          </p:cNvPr>
+          <p:cNvSpPr txBox="1"/>
+          <p:nvPr/>
+        </p:nvSpPr>
+        <p:spPr>
+          <a:xfrm>
+            <a:off x="835768" y="243512"/>
+            <a:ext cx="10853312" cy="6370975"/>
+          </a:xfrm>
+          <a:prstGeom prst="rect">
+            <a:avLst/>
+          </a:prstGeom>
+          <a:noFill/>
+        </p:spPr>
+        <p:txBody>
+          <a:bodyPr wrap="square" rtlCol="0">
+            <a:spAutoFit/>
+          </a:bodyPr>
+          <a:lstStyle/>
+          <a:p>
+            <a:r>
+              <a:rPr lang="zh-CN" altLang="en-US" sz="3600" dirty="0"/>
+              <a:t>隐喻理解：使用或构建新型知识库</a:t>
+            </a:r>
+            <a:endParaRPr lang="en-US" altLang="zh-CN" sz="3600" dirty="0"/>
+          </a:p>
+          <a:p>
+            <a:endParaRPr lang="en-US" altLang="zh-CN" sz="3600" dirty="0"/>
+          </a:p>
+          <a:p>
+            <a:r>
+              <a:rPr lang="en-US" altLang="zh-CN" sz="2800" dirty="0"/>
+              <a:t>3. </a:t>
+            </a:r>
+            <a:r>
+              <a:rPr lang="en-US" altLang="zh-CN" sz="2800" dirty="0" err="1"/>
+              <a:t>FrameNet</a:t>
+            </a:r>
+            <a:r>
+              <a:rPr lang="zh-CN" altLang="en-US" sz="2800" dirty="0"/>
+              <a:t>，认为为绝大多数单词的意义可以通过语义框架呈现，</a:t>
+            </a:r>
+            <a:endParaRPr lang="en-US" altLang="zh-CN" sz="2800" dirty="0"/>
+          </a:p>
+          <a:p>
+            <a:r>
+              <a:rPr lang="zh-CN" altLang="en-US" sz="2800" dirty="0"/>
+              <a:t>库对拥有相同认知结构、相同类型的语义角色的词语进行归类，并用一个框架对这类词进行概述。</a:t>
+            </a:r>
+            <a:r>
+              <a:rPr lang="en-US" altLang="zh-CN" sz="2800" dirty="0"/>
+              <a:t>NLP</a:t>
+            </a:r>
+            <a:r>
+              <a:rPr lang="zh-CN" altLang="en-US" sz="2800" dirty="0"/>
+              <a:t>上用在语义方面老好了</a:t>
+            </a:r>
+            <a:r>
+              <a:rPr lang="en-US" altLang="zh-CN" sz="2800" dirty="0"/>
+              <a:t>_(:з</a:t>
+            </a:r>
+            <a:r>
+              <a:rPr lang="zh-CN" altLang="en-US" sz="2800" dirty="0"/>
+              <a:t>ゝ∠</a:t>
+            </a:r>
+            <a:r>
+              <a:rPr lang="en-US" altLang="zh-CN" sz="2800" dirty="0"/>
+              <a:t>)_</a:t>
+            </a:r>
+          </a:p>
+          <a:p>
+            <a:endParaRPr lang="en-US" altLang="zh-CN" sz="2800" dirty="0"/>
+          </a:p>
+          <a:p>
+            <a:r>
+              <a:rPr lang="en-US" altLang="zh-CN" sz="2800" dirty="0"/>
+              <a:t>4. </a:t>
+            </a:r>
+            <a:r>
+              <a:rPr lang="en-US" altLang="zh-CN" sz="2800" dirty="0" err="1"/>
+              <a:t>HowNet</a:t>
+            </a:r>
+            <a:r>
+              <a:rPr lang="zh-CN" altLang="en-US" sz="2800" dirty="0"/>
+              <a:t>，关注词语概念，是一个以义原为基本单位构建的中英双语知识库。它将概念与概念之间的关系以及概念及其属性之间的关系形成了一个网状的常识系统。</a:t>
+            </a:r>
+            <a:endParaRPr lang="en-US" altLang="zh-CN" sz="2800" dirty="0"/>
+          </a:p>
+          <a:p>
+            <a:endParaRPr lang="en-US" altLang="zh-CN" sz="2800" dirty="0"/>
+          </a:p>
+          <a:p>
+            <a:r>
+              <a:rPr lang="en-US" altLang="zh-CN" sz="2800" dirty="0"/>
+              <a:t>5. </a:t>
+            </a:r>
+            <a:r>
+              <a:rPr lang="en-US" altLang="zh-CN" sz="2800" dirty="0" err="1"/>
+              <a:t>Cogbank</a:t>
+            </a:r>
+            <a:r>
+              <a:rPr lang="en-US" altLang="zh-CN" sz="2800" dirty="0"/>
+              <a:t> </a:t>
+            </a:r>
+            <a:r>
+              <a:rPr lang="zh-CN" altLang="en-US" sz="2800" dirty="0"/>
+              <a:t>是一个自主构建的汉语认知属性知识库。它通过指定隐喻句的句法结构“目标域</a:t>
+            </a:r>
+            <a:r>
+              <a:rPr lang="en-US" altLang="zh-CN" sz="2800" dirty="0"/>
+              <a:t>+</a:t>
+            </a:r>
+            <a:r>
+              <a:rPr lang="zh-CN" altLang="en-US" sz="2800" dirty="0"/>
+              <a:t>像</a:t>
+            </a:r>
+            <a:r>
+              <a:rPr lang="en-US" altLang="zh-CN" sz="2800" dirty="0"/>
+              <a:t>+</a:t>
+            </a:r>
+            <a:r>
+              <a:rPr lang="zh-CN" altLang="en-US" sz="2800" dirty="0"/>
+              <a:t>源域</a:t>
+            </a:r>
+            <a:r>
+              <a:rPr lang="en-US" altLang="zh-CN" sz="2800" dirty="0"/>
+              <a:t>+</a:t>
+            </a:r>
+            <a:r>
+              <a:rPr lang="zh-CN" altLang="en-US" sz="2800" dirty="0"/>
+              <a:t>一样</a:t>
+            </a:r>
+            <a:r>
+              <a:rPr lang="en-US" altLang="zh-CN" sz="2800" dirty="0"/>
+              <a:t>+</a:t>
+            </a:r>
+            <a:r>
+              <a:rPr lang="zh-CN" altLang="en-US" sz="2800" dirty="0"/>
+              <a:t>属性”，从网页中爬取了近百万条“源域词语</a:t>
+            </a:r>
+            <a:r>
+              <a:rPr lang="en-US" altLang="zh-CN" sz="2800" dirty="0"/>
+              <a:t>-</a:t>
+            </a:r>
+            <a:r>
+              <a:rPr lang="zh-CN" altLang="en-US" sz="2800" dirty="0"/>
+              <a:t>属性”对。经过人工校对和信息整理，获得二十多万条词语认知属性对，共包含近万个词语以及认知属性。</a:t>
+            </a:r>
+            <a:endParaRPr lang="en-US" altLang="zh-CN" sz="2800" dirty="0"/>
+          </a:p>
+        </p:txBody>
+      </p:sp>
+    </p:spTree>
+    <p:extLst>
+      <p:ext uri="{BB962C8B-B14F-4D97-AF65-F5344CB8AC3E}">
+        <p14:creationId xmlns:p14="http://schemas.microsoft.com/office/powerpoint/2010/main" val="4259264578"/>
+      </p:ext>
+    </p:extLst>
+  </p:cSld>
+  <p:clrMapOvr>
+    <a:masterClrMapping/>
+  </p:clrMapOvr>
+</p:sld>
+</file>
+
+<file path=ppt/slides/slide22.xml><?xml version="1.0" encoding="utf-8"?>
+<p:sld xmlns:a="http://schemas.openxmlformats.org/drawingml/2006/main" xmlns:r="http://schemas.openxmlformats.org/officeDocument/2006/relationships" xmlns:p="http://schemas.openxmlformats.org/presentationml/2006/main">
+  <p:cSld>
+    <p:spTree>
+      <p:nvGrpSpPr>
+        <p:cNvPr id="1" name=""/>
+        <p:cNvGrpSpPr/>
+        <p:nvPr/>
+      </p:nvGrpSpPr>
+      <p:grpSpPr>
+        <a:xfrm>
+          <a:off x="0" y="0"/>
+          <a:ext cx="0" cy="0"/>
+          <a:chOff x="0" y="0"/>
+          <a:chExt cx="0" cy="0"/>
+        </a:xfrm>
+      </p:grpSpPr>
+      <p:sp>
+        <p:nvSpPr>
+          <p:cNvPr id="3" name="文本框 2">
+            <a:extLst>
+              <a:ext uri="{FF2B5EF4-FFF2-40B4-BE49-F238E27FC236}">
+                <a16:creationId xmlns:a16="http://schemas.microsoft.com/office/drawing/2014/main" id="{934B47D1-33D4-4E4A-8626-897FB2BF44D9}"/>
+              </a:ext>
+            </a:extLst>
+          </p:cNvPr>
+          <p:cNvSpPr txBox="1"/>
+          <p:nvPr/>
+        </p:nvSpPr>
+        <p:spPr>
+          <a:xfrm>
+            <a:off x="835768" y="243512"/>
+            <a:ext cx="10853312" cy="4031873"/>
+          </a:xfrm>
+          <a:prstGeom prst="rect">
+            <a:avLst/>
+          </a:prstGeom>
+          <a:noFill/>
+        </p:spPr>
+        <p:txBody>
+          <a:bodyPr wrap="square" rtlCol="0">
+            <a:spAutoFit/>
+          </a:bodyPr>
+          <a:lstStyle/>
+          <a:p>
+            <a:r>
+              <a:rPr lang="zh-CN" altLang="en-US" sz="3600" dirty="0"/>
+              <a:t>隐喻理解：使用或构建新型知识库</a:t>
+            </a:r>
+            <a:endParaRPr lang="en-US" altLang="zh-CN" sz="3600" dirty="0"/>
+          </a:p>
+          <a:p>
+            <a:endParaRPr lang="en-US" altLang="zh-CN" sz="3600" dirty="0"/>
+          </a:p>
+          <a:p>
+            <a:endParaRPr lang="en-US" altLang="zh-CN" sz="3600" dirty="0"/>
+          </a:p>
+          <a:p>
+            <a:endParaRPr lang="en-US" altLang="zh-CN" sz="3600" dirty="0"/>
+          </a:p>
+          <a:p>
+            <a:r>
+              <a:rPr lang="en-US" altLang="zh-CN" sz="2800" dirty="0"/>
+              <a:t>6. </a:t>
+            </a:r>
+            <a:r>
+              <a:rPr lang="zh-CN" altLang="en-US" sz="2800" dirty="0"/>
+              <a:t>文化属性知识库，处理包含文化负载词的隐喻必须进行文化属性知识嵌入。他们从经典古籍、传统文化研究著作中抽取中国文化中的概念 隐喻，并基于概念隐喻映射获取文化负载词的属性知识，构建文化属性知识库。</a:t>
+            </a:r>
+            <a:endParaRPr lang="en-US" altLang="zh-CN" sz="2800" dirty="0"/>
+          </a:p>
+        </p:txBody>
+      </p:sp>
+    </p:spTree>
+    <p:extLst>
+      <p:ext uri="{BB962C8B-B14F-4D97-AF65-F5344CB8AC3E}">
+        <p14:creationId xmlns:p14="http://schemas.microsoft.com/office/powerpoint/2010/main" val="2971794433"/>
+      </p:ext>
+    </p:extLst>
+  </p:cSld>
+  <p:clrMapOvr>
+    <a:masterClrMapping/>
+  </p:clrMapOvr>
+</p:sld>
+</file>
+
+<file path=ppt/slides/slide23.xml><?xml version="1.0" encoding="utf-8"?>
+<p:sld xmlns:a="http://schemas.openxmlformats.org/drawingml/2006/main" xmlns:r="http://schemas.openxmlformats.org/officeDocument/2006/relationships" xmlns:p="http://schemas.openxmlformats.org/presentationml/2006/main">
+  <p:cSld>
+    <p:spTree>
+      <p:nvGrpSpPr>
+        <p:cNvPr id="1" name=""/>
+        <p:cNvGrpSpPr/>
+        <p:nvPr/>
+      </p:nvGrpSpPr>
+      <p:grpSpPr>
+        <a:xfrm>
+          <a:off x="0" y="0"/>
+          <a:ext cx="0" cy="0"/>
+          <a:chOff x="0" y="0"/>
+          <a:chExt cx="0" cy="0"/>
+        </a:xfrm>
+      </p:grpSpPr>
+      <p:sp>
+        <p:nvSpPr>
+          <p:cNvPr id="4" name="文本框 3">
+            <a:extLst>
+              <a:ext uri="{FF2B5EF4-FFF2-40B4-BE49-F238E27FC236}">
+                <a16:creationId xmlns:a16="http://schemas.microsoft.com/office/drawing/2014/main" id="{89689C59-38D4-4289-BDB3-8DB511A5181D}"/>
+              </a:ext>
+            </a:extLst>
+          </p:cNvPr>
+          <p:cNvSpPr txBox="1"/>
+          <p:nvPr/>
+        </p:nvSpPr>
+        <p:spPr>
+          <a:xfrm>
+            <a:off x="848768" y="2627739"/>
+            <a:ext cx="7047122" cy="1384995"/>
+          </a:xfrm>
+          <a:prstGeom prst="rect">
+            <a:avLst/>
+          </a:prstGeom>
+          <a:noFill/>
+        </p:spPr>
+        <p:txBody>
+          <a:bodyPr wrap="none" rtlCol="0">
+            <a:spAutoFit/>
+          </a:bodyPr>
+          <a:lstStyle/>
+          <a:p>
+            <a:endParaRPr lang="en-US" altLang="zh-CN" sz="2800" dirty="0"/>
+          </a:p>
+          <a:p>
+            <a:r>
+              <a:rPr lang="en-US" altLang="zh-CN" sz="2800" dirty="0"/>
+              <a:t>1. </a:t>
+            </a:r>
+            <a:r>
+              <a:rPr lang="zh-CN" altLang="en-US" sz="2800" dirty="0"/>
+              <a:t>把知识图谱的概念拓展到隐喻识别当中。</a:t>
+            </a:r>
+            <a:endParaRPr lang="en-US" altLang="zh-CN" sz="2800" dirty="0"/>
+          </a:p>
+          <a:p>
+            <a:r>
+              <a:rPr lang="en-US" altLang="zh-CN" sz="2800" dirty="0"/>
+              <a:t>2. </a:t>
+            </a:r>
+            <a:r>
+              <a:rPr lang="zh-CN" altLang="en-US" sz="2800" dirty="0"/>
+              <a:t>把情感分析的概念拓展到隐喻理解当中。</a:t>
+            </a:r>
+            <a:endParaRPr lang="en-US" altLang="zh-CN" sz="2800" dirty="0"/>
+          </a:p>
+        </p:txBody>
+      </p:sp>
+      <p:sp>
+        <p:nvSpPr>
+          <p:cNvPr id="6" name="文本框 5">
+            <a:extLst>
+              <a:ext uri="{FF2B5EF4-FFF2-40B4-BE49-F238E27FC236}">
+                <a16:creationId xmlns:a16="http://schemas.microsoft.com/office/drawing/2014/main" id="{9C48A8B9-2434-4532-AF3A-E8C18969B760}"/>
+              </a:ext>
+            </a:extLst>
+          </p:cNvPr>
+          <p:cNvSpPr txBox="1"/>
+          <p:nvPr/>
+        </p:nvSpPr>
+        <p:spPr>
+          <a:xfrm>
+            <a:off x="3220854" y="807274"/>
+            <a:ext cx="5750292" cy="923330"/>
+          </a:xfrm>
+          <a:prstGeom prst="rect">
+            <a:avLst/>
+          </a:prstGeom>
+          <a:noFill/>
+        </p:spPr>
+        <p:txBody>
+          <a:bodyPr wrap="none" rtlCol="0">
+            <a:spAutoFit/>
+          </a:bodyPr>
+          <a:lstStyle/>
+          <a:p>
+            <a:r>
+              <a:rPr lang="zh-CN" altLang="en-US" sz="5400" b="1" dirty="0"/>
+              <a:t>这段学习的新想法</a:t>
+            </a:r>
+            <a:endParaRPr lang="en-US" altLang="zh-CN" sz="5400" b="1" dirty="0"/>
+          </a:p>
+        </p:txBody>
+      </p:sp>
+    </p:spTree>
+    <p:extLst>
+      <p:ext uri="{BB962C8B-B14F-4D97-AF65-F5344CB8AC3E}">
+        <p14:creationId xmlns:p14="http://schemas.microsoft.com/office/powerpoint/2010/main" val="361049474"/>
+      </p:ext>
+    </p:extLst>
+  </p:cSld>
+  <p:clrMapOvr>
+    <a:masterClrMapping/>
+  </p:clrMapOvr>
+</p:sld>
+</file>
+
+<file path=ppt/slides/slide24.xml><?xml version="1.0" encoding="utf-8"?>
+<p:sld xmlns:a="http://schemas.openxmlformats.org/drawingml/2006/main" xmlns:r="http://schemas.openxmlformats.org/officeDocument/2006/relationships" xmlns:p="http://schemas.openxmlformats.org/presentationml/2006/main">
+  <p:cSld>
+    <p:spTree>
+      <p:nvGrpSpPr>
+        <p:cNvPr id="1" name=""/>
+        <p:cNvGrpSpPr/>
+        <p:nvPr/>
+      </p:nvGrpSpPr>
+      <p:grpSpPr>
+        <a:xfrm>
+          <a:off x="0" y="0"/>
+          <a:ext cx="0" cy="0"/>
+          <a:chOff x="0" y="0"/>
+          <a:chExt cx="0" cy="0"/>
+        </a:xfrm>
+      </p:grpSpPr>
+      <p:sp>
+        <p:nvSpPr>
+          <p:cNvPr id="4" name="文本框 3">
+            <a:extLst>
+              <a:ext uri="{FF2B5EF4-FFF2-40B4-BE49-F238E27FC236}">
+                <a16:creationId xmlns:a16="http://schemas.microsoft.com/office/drawing/2014/main" id="{89689C59-38D4-4289-BDB3-8DB511A5181D}"/>
+              </a:ext>
+            </a:extLst>
+          </p:cNvPr>
+          <p:cNvSpPr txBox="1"/>
+          <p:nvPr/>
+        </p:nvSpPr>
+        <p:spPr>
+          <a:xfrm>
+            <a:off x="848768" y="2627739"/>
+            <a:ext cx="5610831" cy="1384995"/>
+          </a:xfrm>
+          <a:prstGeom prst="rect">
+            <a:avLst/>
+          </a:prstGeom>
+          <a:noFill/>
+        </p:spPr>
+        <p:txBody>
+          <a:bodyPr wrap="none" rtlCol="0">
+            <a:spAutoFit/>
+          </a:bodyPr>
+          <a:lstStyle/>
+          <a:p>
+            <a:r>
+              <a:rPr lang="zh-CN" altLang="en-US" sz="2800" dirty="0"/>
+              <a:t>下期内容：</a:t>
+            </a:r>
+            <a:endParaRPr lang="en-US" altLang="zh-CN" sz="2800" dirty="0"/>
+          </a:p>
+          <a:p>
+            <a:r>
+              <a:rPr lang="en-US" altLang="zh-CN" sz="2800" dirty="0"/>
+              <a:t>0. </a:t>
+            </a:r>
+            <a:r>
+              <a:rPr lang="zh-CN" altLang="en-US" sz="2800" dirty="0"/>
+              <a:t>隐喻识别下的序列化标注探究。</a:t>
+            </a:r>
+            <a:endParaRPr lang="en-US" altLang="zh-CN" sz="2800" dirty="0"/>
+          </a:p>
+          <a:p>
+            <a:r>
+              <a:rPr lang="en-US" altLang="zh-CN" sz="2800" dirty="0"/>
+              <a:t>2. </a:t>
+            </a:r>
+            <a:r>
+              <a:rPr lang="zh-CN" altLang="en-US" sz="2800" dirty="0"/>
+              <a:t>隐喻理解下的更多探究。</a:t>
+            </a:r>
+            <a:endParaRPr lang="en-US" altLang="zh-CN" sz="2800" dirty="0"/>
+          </a:p>
+        </p:txBody>
+      </p:sp>
+      <p:sp>
+        <p:nvSpPr>
+          <p:cNvPr id="6" name="文本框 5">
+            <a:extLst>
+              <a:ext uri="{FF2B5EF4-FFF2-40B4-BE49-F238E27FC236}">
+                <a16:creationId xmlns:a16="http://schemas.microsoft.com/office/drawing/2014/main" id="{9C48A8B9-2434-4532-AF3A-E8C18969B760}"/>
+              </a:ext>
+            </a:extLst>
+          </p:cNvPr>
+          <p:cNvSpPr txBox="1"/>
+          <p:nvPr/>
+        </p:nvSpPr>
+        <p:spPr>
+          <a:xfrm>
+            <a:off x="4628008" y="913954"/>
+            <a:ext cx="3663182" cy="923330"/>
+          </a:xfrm>
+          <a:prstGeom prst="rect">
+            <a:avLst/>
+          </a:prstGeom>
+          <a:noFill/>
+        </p:spPr>
+        <p:txBody>
+          <a:bodyPr wrap="none" rtlCol="0">
+            <a:spAutoFit/>
+          </a:bodyPr>
+          <a:lstStyle/>
+          <a:p>
+            <a:r>
+              <a:rPr lang="zh-CN" altLang="en-US" sz="5400" b="1" dirty="0"/>
+              <a:t>感谢收听！</a:t>
+            </a:r>
+            <a:endParaRPr lang="en-US" altLang="zh-CN" sz="5400" b="1" dirty="0"/>
+          </a:p>
+        </p:txBody>
+      </p:sp>
+    </p:spTree>
+    <p:extLst>
+      <p:ext uri="{BB962C8B-B14F-4D97-AF65-F5344CB8AC3E}">
+        <p14:creationId xmlns:p14="http://schemas.microsoft.com/office/powerpoint/2010/main" val="4206972790"/>
       </p:ext>
     </p:extLst>
   </p:cSld>
@@ -6006,38 +7755,6 @@
           </a:p>
         </p:txBody>
       </p:sp>
-      <p:sp>
-        <p:nvSpPr>
-          <p:cNvPr id="2" name="文本框 1">
-            <a:extLst>
-              <a:ext uri="{FF2B5EF4-FFF2-40B4-BE49-F238E27FC236}">
-                <a16:creationId xmlns:a16="http://schemas.microsoft.com/office/drawing/2014/main" id="{4725A53A-2C8A-E343-A548-BFA4F15282BF}"/>
-              </a:ext>
-            </a:extLst>
-          </p:cNvPr>
-          <p:cNvSpPr txBox="1"/>
-          <p:nvPr/>
-        </p:nvSpPr>
-        <p:spPr>
-          <a:xfrm>
-            <a:off x="986589" y="4090737"/>
-            <a:ext cx="184731" cy="369332"/>
-          </a:xfrm>
-          <a:prstGeom prst="rect">
-            <a:avLst/>
-          </a:prstGeom>
-          <a:noFill/>
-        </p:spPr>
-        <p:txBody>
-          <a:bodyPr wrap="none" rtlCol="0">
-            <a:spAutoFit/>
-          </a:bodyPr>
-          <a:lstStyle/>
-          <a:p>
-            <a:endParaRPr kumimoji="1" lang="zh-CN" altLang="en-US"/>
-          </a:p>
-        </p:txBody>
-      </p:sp>
     </p:spTree>
     <p:extLst>
       <p:ext uri="{BB962C8B-B14F-4D97-AF65-F5344CB8AC3E}">
@@ -6070,46 +7787,6 @@
       </p:grpSpPr>
       <p:sp>
         <p:nvSpPr>
-          <p:cNvPr id="4" name="文本框 3">
-            <a:extLst>
-              <a:ext uri="{FF2B5EF4-FFF2-40B4-BE49-F238E27FC236}">
-                <a16:creationId xmlns:a16="http://schemas.microsoft.com/office/drawing/2014/main" id="{89689C59-38D4-4289-BDB3-8DB511A5181D}"/>
-              </a:ext>
-            </a:extLst>
-          </p:cNvPr>
-          <p:cNvSpPr txBox="1"/>
-          <p:nvPr/>
-        </p:nvSpPr>
-        <p:spPr>
-          <a:xfrm>
-            <a:off x="852256" y="319597"/>
-            <a:ext cx="8747908" cy="400110"/>
-          </a:xfrm>
-          <a:prstGeom prst="rect">
-            <a:avLst/>
-          </a:prstGeom>
-          <a:noFill/>
-        </p:spPr>
-        <p:txBody>
-          <a:bodyPr wrap="none" rtlCol="0">
-            <a:spAutoFit/>
-          </a:bodyPr>
-          <a:lstStyle/>
-          <a:p>
-            <a:r>
-              <a:rPr lang="en" altLang="zh-CN" sz="2000" dirty="0"/>
-              <a:t>Latent semantic similarity based interpretation of Chinese metaphors</a:t>
-            </a:r>
-            <a:r>
-              <a:rPr lang="zh-CN" altLang="en-US" sz="2000" dirty="0"/>
-              <a:t>：</a:t>
-            </a:r>
-            <a:endParaRPr lang="en-US" altLang="zh-CN" sz="2000" dirty="0"/>
-          </a:p>
-        </p:txBody>
-      </p:sp>
-      <p:sp>
-        <p:nvSpPr>
           <p:cNvPr id="6" name="文本框 5">
             <a:extLst>
               <a:ext uri="{FF2B5EF4-FFF2-40B4-BE49-F238E27FC236}">
@@ -6122,8 +7799,8 @@
         </p:nvSpPr>
         <p:spPr>
           <a:xfrm>
-            <a:off x="1230546" y="2736502"/>
-            <a:ext cx="10455470" cy="1815882"/>
+            <a:off x="1158357" y="3167390"/>
+            <a:ext cx="10455470" cy="523220"/>
           </a:xfrm>
           <a:prstGeom prst="rect">
             <a:avLst/>
@@ -6136,84 +7813,30 @@
           </a:bodyPr>
           <a:lstStyle/>
           <a:p>
-            <a:pPr marL="514350" indent="-514350">
-              <a:buAutoNum type="arabicPeriod"/>
-            </a:pPr>
             <a:r>
               <a:rPr lang="zh-CN" altLang="en-US" sz="2800" dirty="0"/>
-              <a:t>对于每一个隐喻句，使用</a:t>
+              <a:t>今天主要讨论两篇</a:t>
+            </a:r>
+            <a:r>
+              <a:rPr lang="en-US" altLang="zh-CN" sz="2800" dirty="0" err="1"/>
+              <a:t>Su</a:t>
             </a:r>
             <a:r>
               <a:rPr lang="en-US" altLang="zh-CN" sz="2800" dirty="0"/>
-              <a:t>Sardonicus</a:t>
+              <a:t> Chang</a:t>
             </a:r>
             <a:r>
               <a:rPr lang="zh-CN" altLang="en-US" sz="2800" dirty="0"/>
-              <a:t>和属性知识库中提取源域，系统计算从目标域到源域各个属性之间的关联性。</a:t>
+              <a:t>的论文，主要方向均在隐喻理解方面。</a:t>
             </a:r>
             <a:endParaRPr lang="en-US" altLang="zh-CN" sz="2800" dirty="0"/>
-          </a:p>
-          <a:p>
-            <a:pPr marL="514350" indent="-514350">
-              <a:buAutoNum type="arabicPeriod"/>
-            </a:pPr>
-            <a:r>
-              <a:rPr lang="zh-CN" altLang="en-US" sz="2800" dirty="0"/>
-              <a:t>基于词向量模型使用余弦相似度来进行词语相关性的度量。</a:t>
-            </a:r>
-            <a:endParaRPr lang="en-US" altLang="zh-CN" sz="2800" dirty="0"/>
-          </a:p>
-          <a:p>
-            <a:pPr marL="514350" indent="-514350">
-              <a:buAutoNum type="arabicPeriod"/>
-            </a:pPr>
-            <a:r>
-              <a:rPr lang="zh-CN" altLang="en-US" sz="2800" dirty="0"/>
-              <a:t>系统选出最相关的属性作为隐喻的最佳释义。</a:t>
-            </a:r>
-          </a:p>
-        </p:txBody>
-      </p:sp>
-      <p:sp>
-        <p:nvSpPr>
-          <p:cNvPr id="5" name="文本框 4">
-            <a:extLst>
-              <a:ext uri="{FF2B5EF4-FFF2-40B4-BE49-F238E27FC236}">
-                <a16:creationId xmlns:a16="http://schemas.microsoft.com/office/drawing/2014/main" id="{6BD98EA0-3AA0-9F4B-AC9A-17C0AD6822B9}"/>
-              </a:ext>
-            </a:extLst>
-          </p:cNvPr>
-          <p:cNvSpPr txBox="1"/>
-          <p:nvPr/>
-        </p:nvSpPr>
-        <p:spPr>
-          <a:xfrm>
-            <a:off x="852256" y="779685"/>
-            <a:ext cx="2236510" cy="584775"/>
-          </a:xfrm>
-          <a:prstGeom prst="rect">
-            <a:avLst/>
-          </a:prstGeom>
-          <a:noFill/>
-        </p:spPr>
-        <p:txBody>
-          <a:bodyPr wrap="none" rtlCol="0">
-            <a:spAutoFit/>
-          </a:bodyPr>
-          <a:lstStyle/>
-          <a:p>
-            <a:r>
-              <a:rPr lang="zh-CN" altLang="en-US" sz="3200" dirty="0"/>
-              <a:t>模型步骤：</a:t>
-            </a:r>
-            <a:endParaRPr lang="en-US" altLang="zh-CN" sz="3200" dirty="0"/>
           </a:p>
         </p:txBody>
       </p:sp>
     </p:spTree>
     <p:extLst>
       <p:ext uri="{BB962C8B-B14F-4D97-AF65-F5344CB8AC3E}">
-        <p14:creationId xmlns:p14="http://schemas.microsoft.com/office/powerpoint/2010/main" val="766303945"/>
+        <p14:creationId xmlns:p14="http://schemas.microsoft.com/office/powerpoint/2010/main" val="2070588892"/>
       </p:ext>
     </p:extLst>
   </p:cSld>
@@ -6254,8 +7877,8 @@
         </p:nvSpPr>
         <p:spPr>
           <a:xfrm>
-            <a:off x="852256" y="319597"/>
-            <a:ext cx="8747908" cy="400110"/>
+            <a:off x="788409" y="379575"/>
+            <a:ext cx="11339744" cy="400110"/>
           </a:xfrm>
           <a:prstGeom prst="rect">
             <a:avLst/>
@@ -6263,14 +7886,22 @@
           <a:noFill/>
         </p:spPr>
         <p:txBody>
-          <a:bodyPr wrap="none" rtlCol="0">
+          <a:bodyPr wrap="square" rtlCol="0">
             <a:spAutoFit/>
           </a:bodyPr>
           <a:lstStyle/>
           <a:p>
             <a:r>
               <a:rPr lang="en" altLang="zh-CN" sz="2000" dirty="0"/>
-              <a:t>Latent semantic similarity based interpretation of Chinese metaphors</a:t>
+              <a:t>Automatic detection and interpretation of nominal metaphor based on the</a:t>
+            </a:r>
+            <a:r>
+              <a:rPr lang="zh-CN" altLang="en-US" sz="2000" dirty="0"/>
+              <a:t> </a:t>
+            </a:r>
+            <a:r>
+              <a:rPr lang="en" altLang="zh-CN" sz="2000" dirty="0"/>
+              <a:t>theory of meaning</a:t>
             </a:r>
             <a:r>
               <a:rPr lang="zh-CN" altLang="en-US" sz="2000" dirty="0"/>
@@ -6294,8 +7925,8 @@
         </p:nvSpPr>
         <p:spPr>
           <a:xfrm>
-            <a:off x="1230546" y="2736502"/>
-            <a:ext cx="10455470" cy="1384995"/>
+            <a:off x="1230546" y="2090172"/>
+            <a:ext cx="10455470" cy="3539430"/>
           </a:xfrm>
           <a:prstGeom prst="rect">
             <a:avLst/>
@@ -6313,7 +7944,7 @@
             </a:pPr>
             <a:r>
               <a:rPr lang="zh-CN" altLang="en-US" sz="2800" dirty="0"/>
-              <a:t>对于每一个隐喻句，提取源域和目标域的概念特征</a:t>
+              <a:t>这篇论文提出了一个方法去识别名词性隐喻和通过发掘分布式的词语嵌入方法和计算语义相似度来翻译隐喻。</a:t>
             </a:r>
             <a:endParaRPr lang="en-US" altLang="zh-CN" sz="2800" dirty="0"/>
           </a:p>
@@ -6321,18 +7952,6 @@
             <a:pPr marL="514350" indent="-514350">
               <a:buAutoNum type="arabicPeriod"/>
             </a:pPr>
-            <a:r>
-              <a:rPr lang="zh-CN" altLang="en-US" sz="2800" dirty="0"/>
-              <a:t>基于</a:t>
-            </a:r>
-            <a:r>
-              <a:rPr lang="en-US" altLang="zh-CN" sz="2800" dirty="0"/>
-              <a:t>WordNet</a:t>
-            </a:r>
-            <a:r>
-              <a:rPr lang="zh-CN" altLang="en-US" sz="2800" dirty="0"/>
-              <a:t> 对于提取出的特征做同义扩展</a:t>
-            </a:r>
             <a:endParaRPr lang="en-US" altLang="zh-CN" sz="2800" dirty="0"/>
           </a:p>
           <a:p>
@@ -6341,23 +7960,23 @@
             </a:pPr>
             <a:r>
               <a:rPr lang="zh-CN" altLang="en-US" sz="2800" dirty="0"/>
-              <a:t>用</a:t>
-            </a:r>
-            <a:r>
-              <a:rPr lang="en-US" altLang="zh-CN" sz="2800" dirty="0"/>
-              <a:t>Google</a:t>
-            </a:r>
+              <a:t>识别方面就是通过一种算法来计算源域和目标域相似度，如果高于一个阙值就是隐喻，反之亦然。</a:t>
+            </a:r>
+            <a:endParaRPr lang="en-US" altLang="zh-CN" sz="2800" dirty="0"/>
+          </a:p>
+          <a:p>
+            <a:pPr marL="514350" indent="-514350">
+              <a:buAutoNum type="arabicPeriod"/>
+            </a:pPr>
+            <a:endParaRPr lang="en-US" altLang="zh-CN" sz="2800" dirty="0"/>
+          </a:p>
+          <a:p>
+            <a:pPr marL="514350" indent="-514350">
+              <a:buAutoNum type="arabicPeriod"/>
+            </a:pPr>
             <a:r>
               <a:rPr lang="zh-CN" altLang="en-US" sz="2800" dirty="0"/>
-              <a:t> </a:t>
-            </a:r>
-            <a:r>
-              <a:rPr lang="en-US" altLang="zh-CN" sz="2800" dirty="0"/>
-              <a:t>Distance </a:t>
-            </a:r>
-            <a:r>
-              <a:rPr lang="zh-CN" altLang="en-US" sz="2800" dirty="0"/>
-              <a:t>来对理解结果做排序，选出最优解</a:t>
+              <a:t>理解方面就是基于源域和目标域的合作理论，使用“属性提取”和“属性转移”的步骤来翻译。</a:t>
             </a:r>
           </a:p>
         </p:txBody>
@@ -6376,8 +7995,8 @@
         </p:nvSpPr>
         <p:spPr>
           <a:xfrm>
-            <a:off x="852256" y="779685"/>
-            <a:ext cx="2236510" cy="584775"/>
+            <a:off x="743608" y="779685"/>
+            <a:ext cx="1415772" cy="584775"/>
           </a:xfrm>
           <a:prstGeom prst="rect">
             <a:avLst/>
@@ -6392,7 +8011,7 @@
           <a:p>
             <a:r>
               <a:rPr lang="zh-CN" altLang="en-US" sz="3200" dirty="0"/>
-              <a:t>模型步骤：</a:t>
+              <a:t>概述：</a:t>
             </a:r>
             <a:endParaRPr lang="en-US" altLang="zh-CN" sz="3200" dirty="0"/>
           </a:p>
@@ -6401,7 +8020,7 @@
     </p:spTree>
     <p:extLst>
       <p:ext uri="{BB962C8B-B14F-4D97-AF65-F5344CB8AC3E}">
-        <p14:creationId xmlns:p14="http://schemas.microsoft.com/office/powerpoint/2010/main" val="3782646572"/>
+        <p14:creationId xmlns:p14="http://schemas.microsoft.com/office/powerpoint/2010/main" val="1214661599"/>
       </p:ext>
     </p:extLst>
   </p:cSld>

</xml_diff>